<commit_message>
typos in lecture 7
</commit_message>
<xml_diff>
--- a/classes/prog2016/Prog3-Lecture07.pptx
+++ b/classes/prog2016/Prog3-Lecture07.pptx
@@ -143,6 +143,22 @@
       </a:defRPr>
     </a:lvl9pPr>
   </p:defaultTextStyle>
+  <p:extLst>
+    <p:ext uri="{EFAFB233-063F-42B5-8137-9DF3F51BA10A}">
+      <p15:sldGuideLst xmlns:p15="http://schemas.microsoft.com/office/powerpoint/2012/main">
+        <p15:guide id="1" orient="horz" pos="2160">
+          <p15:clr>
+            <a:srgbClr val="A4A3A4"/>
+          </p15:clr>
+        </p15:guide>
+        <p15:guide id="2" pos="2880">
+          <p15:clr>
+            <a:srgbClr val="A4A3A4"/>
+          </p15:clr>
+        </p15:guide>
+      </p15:sldGuideLst>
+    </p:ext>
+  </p:extLst>
 </p:presentation>
 </file>
 
@@ -229,7 +245,7 @@
             <a:fld id="{32335909-3D24-4715-B7D8-CE21EEF0751A}" type="datetimeFigureOut">
               <a:rPr lang="en-US" smtClean="0"/>
               <a:pPr/>
-              <a:t>9/12/2015</a:t>
+              <a:t>9/16/2016</a:t>
             </a:fld>
             <a:endParaRPr lang="en-US"/>
           </a:p>
@@ -295,38 +311,37 @@
           <a:p>
             <a:pPr lvl="0"/>
             <a:r>
-              <a:rPr lang="en-US" smtClean="0"/>
+              <a:rPr lang="en-US"/>
               <a:t>Click to edit Master text styles</a:t>
             </a:r>
           </a:p>
           <a:p>
             <a:pPr lvl="1"/>
             <a:r>
-              <a:rPr lang="en-US" smtClean="0"/>
+              <a:rPr lang="en-US"/>
               <a:t>Second level</a:t>
             </a:r>
           </a:p>
           <a:p>
             <a:pPr lvl="2"/>
             <a:r>
-              <a:rPr lang="en-US" smtClean="0"/>
+              <a:rPr lang="en-US"/>
               <a:t>Third level</a:t>
             </a:r>
           </a:p>
           <a:p>
             <a:pPr lvl="3"/>
             <a:r>
-              <a:rPr lang="en-US" smtClean="0"/>
+              <a:rPr lang="en-US"/>
               <a:t>Fourth level</a:t>
             </a:r>
           </a:p>
           <a:p>
             <a:pPr lvl="4"/>
             <a:r>
-              <a:rPr lang="en-US" smtClean="0"/>
+              <a:rPr lang="en-US"/>
               <a:t>Fifth level</a:t>
             </a:r>
-            <a:endParaRPr lang="en-US"/>
           </a:p>
         </p:txBody>
       </p:sp>
@@ -3567,10 +3582,9 @@
           <a:lstStyle/>
           <a:p>
             <a:r>
-              <a:rPr lang="en-US" smtClean="0"/>
+              <a:rPr lang="en-US"/>
               <a:t>Click to edit Master title style</a:t>
             </a:r>
-            <a:endParaRPr lang="en-US"/>
           </a:p>
         </p:txBody>
       </p:sp>
@@ -3686,10 +3700,9 @@
           </a:lstStyle>
           <a:p>
             <a:r>
-              <a:rPr lang="en-US" smtClean="0"/>
+              <a:rPr lang="en-US"/>
               <a:t>Click to edit Master subtitle style</a:t>
             </a:r>
-            <a:endParaRPr lang="en-US"/>
           </a:p>
         </p:txBody>
       </p:sp>
@@ -3711,7 +3724,7 @@
             <a:fld id="{1D8BD707-D9CF-40AE-B4C6-C98DA3205C09}" type="datetimeFigureOut">
               <a:rPr lang="en-US" smtClean="0"/>
               <a:pPr/>
-              <a:t>9/12/2015</a:t>
+              <a:t>9/16/2016</a:t>
             </a:fld>
             <a:endParaRPr lang="en-US"/>
           </a:p>
@@ -3801,10 +3814,9 @@
           <a:lstStyle/>
           <a:p>
             <a:r>
-              <a:rPr lang="en-US" smtClean="0"/>
+              <a:rPr lang="en-US"/>
               <a:t>Click to edit Master title style</a:t>
             </a:r>
-            <a:endParaRPr lang="en-US"/>
           </a:p>
         </p:txBody>
       </p:sp>
@@ -3825,38 +3837,37 @@
           <a:p>
             <a:pPr lvl="0"/>
             <a:r>
-              <a:rPr lang="en-US" smtClean="0"/>
+              <a:rPr lang="en-US"/>
               <a:t>Click to edit Master text styles</a:t>
             </a:r>
           </a:p>
           <a:p>
             <a:pPr lvl="1"/>
             <a:r>
-              <a:rPr lang="en-US" smtClean="0"/>
+              <a:rPr lang="en-US"/>
               <a:t>Second level</a:t>
             </a:r>
           </a:p>
           <a:p>
             <a:pPr lvl="2"/>
             <a:r>
-              <a:rPr lang="en-US" smtClean="0"/>
+              <a:rPr lang="en-US"/>
               <a:t>Third level</a:t>
             </a:r>
           </a:p>
           <a:p>
             <a:pPr lvl="3"/>
             <a:r>
-              <a:rPr lang="en-US" smtClean="0"/>
+              <a:rPr lang="en-US"/>
               <a:t>Fourth level</a:t>
             </a:r>
           </a:p>
           <a:p>
             <a:pPr lvl="4"/>
             <a:r>
-              <a:rPr lang="en-US" smtClean="0"/>
+              <a:rPr lang="en-US"/>
               <a:t>Fifth level</a:t>
             </a:r>
-            <a:endParaRPr lang="en-US"/>
           </a:p>
         </p:txBody>
       </p:sp>
@@ -3878,7 +3889,7 @@
             <a:fld id="{1D8BD707-D9CF-40AE-B4C6-C98DA3205C09}" type="datetimeFigureOut">
               <a:rPr lang="en-US" smtClean="0"/>
               <a:pPr/>
-              <a:t>9/12/2015</a:t>
+              <a:t>9/16/2016</a:t>
             </a:fld>
             <a:endParaRPr lang="en-US"/>
           </a:p>
@@ -3973,10 +3984,9 @@
           <a:lstStyle/>
           <a:p>
             <a:r>
-              <a:rPr lang="en-US" smtClean="0"/>
+              <a:rPr lang="en-US"/>
               <a:t>Click to edit Master title style</a:t>
             </a:r>
-            <a:endParaRPr lang="en-US"/>
           </a:p>
         </p:txBody>
       </p:sp>
@@ -4002,38 +4012,37 @@
           <a:p>
             <a:pPr lvl="0"/>
             <a:r>
-              <a:rPr lang="en-US" smtClean="0"/>
+              <a:rPr lang="en-US"/>
               <a:t>Click to edit Master text styles</a:t>
             </a:r>
           </a:p>
           <a:p>
             <a:pPr lvl="1"/>
             <a:r>
-              <a:rPr lang="en-US" smtClean="0"/>
+              <a:rPr lang="en-US"/>
               <a:t>Second level</a:t>
             </a:r>
           </a:p>
           <a:p>
             <a:pPr lvl="2"/>
             <a:r>
-              <a:rPr lang="en-US" smtClean="0"/>
+              <a:rPr lang="en-US"/>
               <a:t>Third level</a:t>
             </a:r>
           </a:p>
           <a:p>
             <a:pPr lvl="3"/>
             <a:r>
-              <a:rPr lang="en-US" smtClean="0"/>
+              <a:rPr lang="en-US"/>
               <a:t>Fourth level</a:t>
             </a:r>
           </a:p>
           <a:p>
             <a:pPr lvl="4"/>
             <a:r>
-              <a:rPr lang="en-US" smtClean="0"/>
+              <a:rPr lang="en-US"/>
               <a:t>Fifth level</a:t>
             </a:r>
-            <a:endParaRPr lang="en-US"/>
           </a:p>
         </p:txBody>
       </p:sp>
@@ -4055,7 +4064,7 @@
             <a:fld id="{1D8BD707-D9CF-40AE-B4C6-C98DA3205C09}" type="datetimeFigureOut">
               <a:rPr lang="en-US" smtClean="0"/>
               <a:pPr/>
-              <a:t>9/12/2015</a:t>
+              <a:t>9/16/2016</a:t>
             </a:fld>
             <a:endParaRPr lang="en-US"/>
           </a:p>
@@ -4145,10 +4154,9 @@
           <a:lstStyle/>
           <a:p>
             <a:r>
-              <a:rPr lang="en-US" smtClean="0"/>
+              <a:rPr lang="en-US"/>
               <a:t>Click to edit Master title style</a:t>
             </a:r>
-            <a:endParaRPr lang="en-US"/>
           </a:p>
         </p:txBody>
       </p:sp>
@@ -4169,38 +4177,37 @@
           <a:p>
             <a:pPr lvl="0"/>
             <a:r>
-              <a:rPr lang="en-US" smtClean="0"/>
+              <a:rPr lang="en-US"/>
               <a:t>Click to edit Master text styles</a:t>
             </a:r>
           </a:p>
           <a:p>
             <a:pPr lvl="1"/>
             <a:r>
-              <a:rPr lang="en-US" smtClean="0"/>
+              <a:rPr lang="en-US"/>
               <a:t>Second level</a:t>
             </a:r>
           </a:p>
           <a:p>
             <a:pPr lvl="2"/>
             <a:r>
-              <a:rPr lang="en-US" smtClean="0"/>
+              <a:rPr lang="en-US"/>
               <a:t>Third level</a:t>
             </a:r>
           </a:p>
           <a:p>
             <a:pPr lvl="3"/>
             <a:r>
-              <a:rPr lang="en-US" smtClean="0"/>
+              <a:rPr lang="en-US"/>
               <a:t>Fourth level</a:t>
             </a:r>
           </a:p>
           <a:p>
             <a:pPr lvl="4"/>
             <a:r>
-              <a:rPr lang="en-US" smtClean="0"/>
+              <a:rPr lang="en-US"/>
               <a:t>Fifth level</a:t>
             </a:r>
-            <a:endParaRPr lang="en-US"/>
           </a:p>
         </p:txBody>
       </p:sp>
@@ -4222,7 +4229,7 @@
             <a:fld id="{1D8BD707-D9CF-40AE-B4C6-C98DA3205C09}" type="datetimeFigureOut">
               <a:rPr lang="en-US" smtClean="0"/>
               <a:pPr/>
-              <a:t>9/12/2015</a:t>
+              <a:t>9/16/2016</a:t>
             </a:fld>
             <a:endParaRPr lang="en-US"/>
           </a:p>
@@ -4321,10 +4328,9 @@
           </a:lstStyle>
           <a:p>
             <a:r>
-              <a:rPr lang="en-US" smtClean="0"/>
+              <a:rPr lang="en-US"/>
               <a:t>Click to edit Master title style</a:t>
             </a:r>
-            <a:endParaRPr lang="en-US"/>
           </a:p>
         </p:txBody>
       </p:sp>
@@ -4441,7 +4447,7 @@
           <a:p>
             <a:pPr lvl="0"/>
             <a:r>
-              <a:rPr lang="en-US" smtClean="0"/>
+              <a:rPr lang="en-US"/>
               <a:t>Click to edit Master text styles</a:t>
             </a:r>
           </a:p>
@@ -4465,7 +4471,7 @@
             <a:fld id="{1D8BD707-D9CF-40AE-B4C6-C98DA3205C09}" type="datetimeFigureOut">
               <a:rPr lang="en-US" smtClean="0"/>
               <a:pPr/>
-              <a:t>9/12/2015</a:t>
+              <a:t>9/16/2016</a:t>
             </a:fld>
             <a:endParaRPr lang="en-US"/>
           </a:p>
@@ -4555,10 +4561,9 @@
           <a:lstStyle/>
           <a:p>
             <a:r>
-              <a:rPr lang="en-US" smtClean="0"/>
+              <a:rPr lang="en-US"/>
               <a:t>Click to edit Master title style</a:t>
             </a:r>
-            <a:endParaRPr lang="en-US"/>
           </a:p>
         </p:txBody>
       </p:sp>
@@ -4612,38 +4617,37 @@
           <a:p>
             <a:pPr lvl="0"/>
             <a:r>
-              <a:rPr lang="en-US" smtClean="0"/>
+              <a:rPr lang="en-US"/>
               <a:t>Click to edit Master text styles</a:t>
             </a:r>
           </a:p>
           <a:p>
             <a:pPr lvl="1"/>
             <a:r>
-              <a:rPr lang="en-US" smtClean="0"/>
+              <a:rPr lang="en-US"/>
               <a:t>Second level</a:t>
             </a:r>
           </a:p>
           <a:p>
             <a:pPr lvl="2"/>
             <a:r>
-              <a:rPr lang="en-US" smtClean="0"/>
+              <a:rPr lang="en-US"/>
               <a:t>Third level</a:t>
             </a:r>
           </a:p>
           <a:p>
             <a:pPr lvl="3"/>
             <a:r>
-              <a:rPr lang="en-US" smtClean="0"/>
+              <a:rPr lang="en-US"/>
               <a:t>Fourth level</a:t>
             </a:r>
           </a:p>
           <a:p>
             <a:pPr lvl="4"/>
             <a:r>
-              <a:rPr lang="en-US" smtClean="0"/>
+              <a:rPr lang="en-US"/>
               <a:t>Fifth level</a:t>
             </a:r>
-            <a:endParaRPr lang="en-US"/>
           </a:p>
         </p:txBody>
       </p:sp>
@@ -4697,38 +4701,37 @@
           <a:p>
             <a:pPr lvl="0"/>
             <a:r>
-              <a:rPr lang="en-US" smtClean="0"/>
+              <a:rPr lang="en-US"/>
               <a:t>Click to edit Master text styles</a:t>
             </a:r>
           </a:p>
           <a:p>
             <a:pPr lvl="1"/>
             <a:r>
-              <a:rPr lang="en-US" smtClean="0"/>
+              <a:rPr lang="en-US"/>
               <a:t>Second level</a:t>
             </a:r>
           </a:p>
           <a:p>
             <a:pPr lvl="2"/>
             <a:r>
-              <a:rPr lang="en-US" smtClean="0"/>
+              <a:rPr lang="en-US"/>
               <a:t>Third level</a:t>
             </a:r>
           </a:p>
           <a:p>
             <a:pPr lvl="3"/>
             <a:r>
-              <a:rPr lang="en-US" smtClean="0"/>
+              <a:rPr lang="en-US"/>
               <a:t>Fourth level</a:t>
             </a:r>
           </a:p>
           <a:p>
             <a:pPr lvl="4"/>
             <a:r>
-              <a:rPr lang="en-US" smtClean="0"/>
+              <a:rPr lang="en-US"/>
               <a:t>Fifth level</a:t>
             </a:r>
-            <a:endParaRPr lang="en-US"/>
           </a:p>
         </p:txBody>
       </p:sp>
@@ -4750,7 +4753,7 @@
             <a:fld id="{1D8BD707-D9CF-40AE-B4C6-C98DA3205C09}" type="datetimeFigureOut">
               <a:rPr lang="en-US" smtClean="0"/>
               <a:pPr/>
-              <a:t>9/12/2015</a:t>
+              <a:t>9/16/2016</a:t>
             </a:fld>
             <a:endParaRPr lang="en-US"/>
           </a:p>
@@ -4844,10 +4847,9 @@
           </a:lstStyle>
           <a:p>
             <a:r>
-              <a:rPr lang="en-US" smtClean="0"/>
+              <a:rPr lang="en-US"/>
               <a:t>Click to edit Master title style</a:t>
             </a:r>
-            <a:endParaRPr lang="en-US"/>
           </a:p>
         </p:txBody>
       </p:sp>
@@ -4910,7 +4912,7 @@
           <a:p>
             <a:pPr lvl="0"/>
             <a:r>
-              <a:rPr lang="en-US" smtClean="0"/>
+              <a:rPr lang="en-US"/>
               <a:t>Click to edit Master text styles</a:t>
             </a:r>
           </a:p>
@@ -4966,38 +4968,37 @@
           <a:p>
             <a:pPr lvl="0"/>
             <a:r>
-              <a:rPr lang="en-US" smtClean="0"/>
+              <a:rPr lang="en-US"/>
               <a:t>Click to edit Master text styles</a:t>
             </a:r>
           </a:p>
           <a:p>
             <a:pPr lvl="1"/>
             <a:r>
-              <a:rPr lang="en-US" smtClean="0"/>
+              <a:rPr lang="en-US"/>
               <a:t>Second level</a:t>
             </a:r>
           </a:p>
           <a:p>
             <a:pPr lvl="2"/>
             <a:r>
-              <a:rPr lang="en-US" smtClean="0"/>
+              <a:rPr lang="en-US"/>
               <a:t>Third level</a:t>
             </a:r>
           </a:p>
           <a:p>
             <a:pPr lvl="3"/>
             <a:r>
-              <a:rPr lang="en-US" smtClean="0"/>
+              <a:rPr lang="en-US"/>
               <a:t>Fourth level</a:t>
             </a:r>
           </a:p>
           <a:p>
             <a:pPr lvl="4"/>
             <a:r>
-              <a:rPr lang="en-US" smtClean="0"/>
+              <a:rPr lang="en-US"/>
               <a:t>Fifth level</a:t>
             </a:r>
-            <a:endParaRPr lang="en-US"/>
           </a:p>
         </p:txBody>
       </p:sp>
@@ -5060,7 +5061,7 @@
           <a:p>
             <a:pPr lvl="0"/>
             <a:r>
-              <a:rPr lang="en-US" smtClean="0"/>
+              <a:rPr lang="en-US"/>
               <a:t>Click to edit Master text styles</a:t>
             </a:r>
           </a:p>
@@ -5116,38 +5117,37 @@
           <a:p>
             <a:pPr lvl="0"/>
             <a:r>
-              <a:rPr lang="en-US" smtClean="0"/>
+              <a:rPr lang="en-US"/>
               <a:t>Click to edit Master text styles</a:t>
             </a:r>
           </a:p>
           <a:p>
             <a:pPr lvl="1"/>
             <a:r>
-              <a:rPr lang="en-US" smtClean="0"/>
+              <a:rPr lang="en-US"/>
               <a:t>Second level</a:t>
             </a:r>
           </a:p>
           <a:p>
             <a:pPr lvl="2"/>
             <a:r>
-              <a:rPr lang="en-US" smtClean="0"/>
+              <a:rPr lang="en-US"/>
               <a:t>Third level</a:t>
             </a:r>
           </a:p>
           <a:p>
             <a:pPr lvl="3"/>
             <a:r>
-              <a:rPr lang="en-US" smtClean="0"/>
+              <a:rPr lang="en-US"/>
               <a:t>Fourth level</a:t>
             </a:r>
           </a:p>
           <a:p>
             <a:pPr lvl="4"/>
             <a:r>
-              <a:rPr lang="en-US" smtClean="0"/>
+              <a:rPr lang="en-US"/>
               <a:t>Fifth level</a:t>
             </a:r>
-            <a:endParaRPr lang="en-US"/>
           </a:p>
         </p:txBody>
       </p:sp>
@@ -5169,7 +5169,7 @@
             <a:fld id="{1D8BD707-D9CF-40AE-B4C6-C98DA3205C09}" type="datetimeFigureOut">
               <a:rPr lang="en-US" smtClean="0"/>
               <a:pPr/>
-              <a:t>9/12/2015</a:t>
+              <a:t>9/16/2016</a:t>
             </a:fld>
             <a:endParaRPr lang="en-US"/>
           </a:p>
@@ -5259,10 +5259,9 @@
           <a:lstStyle/>
           <a:p>
             <a:r>
-              <a:rPr lang="en-US" smtClean="0"/>
+              <a:rPr lang="en-US"/>
               <a:t>Click to edit Master title style</a:t>
             </a:r>
-            <a:endParaRPr lang="en-US"/>
           </a:p>
         </p:txBody>
       </p:sp>
@@ -5284,7 +5283,7 @@
             <a:fld id="{1D8BD707-D9CF-40AE-B4C6-C98DA3205C09}" type="datetimeFigureOut">
               <a:rPr lang="en-US" smtClean="0"/>
               <a:pPr/>
-              <a:t>9/12/2015</a:t>
+              <a:t>9/16/2016</a:t>
             </a:fld>
             <a:endParaRPr lang="en-US"/>
           </a:p>
@@ -5376,7 +5375,7 @@
             <a:fld id="{1D8BD707-D9CF-40AE-B4C6-C98DA3205C09}" type="datetimeFigureOut">
               <a:rPr lang="en-US" smtClean="0"/>
               <a:pPr/>
-              <a:t>9/12/2015</a:t>
+              <a:t>9/16/2016</a:t>
             </a:fld>
             <a:endParaRPr lang="en-US"/>
           </a:p>
@@ -5475,10 +5474,9 @@
           </a:lstStyle>
           <a:p>
             <a:r>
-              <a:rPr lang="en-US" smtClean="0"/>
+              <a:rPr lang="en-US"/>
               <a:t>Click to edit Master title style</a:t>
             </a:r>
-            <a:endParaRPr lang="en-US"/>
           </a:p>
         </p:txBody>
       </p:sp>
@@ -5532,38 +5530,37 @@
           <a:p>
             <a:pPr lvl="0"/>
             <a:r>
-              <a:rPr lang="en-US" smtClean="0"/>
+              <a:rPr lang="en-US"/>
               <a:t>Click to edit Master text styles</a:t>
             </a:r>
           </a:p>
           <a:p>
             <a:pPr lvl="1"/>
             <a:r>
-              <a:rPr lang="en-US" smtClean="0"/>
+              <a:rPr lang="en-US"/>
               <a:t>Second level</a:t>
             </a:r>
           </a:p>
           <a:p>
             <a:pPr lvl="2"/>
             <a:r>
-              <a:rPr lang="en-US" smtClean="0"/>
+              <a:rPr lang="en-US"/>
               <a:t>Third level</a:t>
             </a:r>
           </a:p>
           <a:p>
             <a:pPr lvl="3"/>
             <a:r>
-              <a:rPr lang="en-US" smtClean="0"/>
+              <a:rPr lang="en-US"/>
               <a:t>Fourth level</a:t>
             </a:r>
           </a:p>
           <a:p>
             <a:pPr lvl="4"/>
             <a:r>
-              <a:rPr lang="en-US" smtClean="0"/>
+              <a:rPr lang="en-US"/>
               <a:t>Fifth level</a:t>
             </a:r>
-            <a:endParaRPr lang="en-US"/>
           </a:p>
         </p:txBody>
       </p:sp>
@@ -5626,7 +5623,7 @@
           <a:p>
             <a:pPr lvl="0"/>
             <a:r>
-              <a:rPr lang="en-US" smtClean="0"/>
+              <a:rPr lang="en-US"/>
               <a:t>Click to edit Master text styles</a:t>
             </a:r>
           </a:p>
@@ -5650,7 +5647,7 @@
             <a:fld id="{1D8BD707-D9CF-40AE-B4C6-C98DA3205C09}" type="datetimeFigureOut">
               <a:rPr lang="en-US" smtClean="0"/>
               <a:pPr/>
-              <a:t>9/12/2015</a:t>
+              <a:t>9/16/2016</a:t>
             </a:fld>
             <a:endParaRPr lang="en-US"/>
           </a:p>
@@ -5749,10 +5746,9 @@
           </a:lstStyle>
           <a:p>
             <a:r>
-              <a:rPr lang="en-US" smtClean="0"/>
+              <a:rPr lang="en-US"/>
               <a:t>Click to edit Master title style</a:t>
             </a:r>
-            <a:endParaRPr lang="en-US"/>
           </a:p>
         </p:txBody>
       </p:sp>
@@ -5876,7 +5872,7 @@
           <a:p>
             <a:pPr lvl="0"/>
             <a:r>
-              <a:rPr lang="en-US" smtClean="0"/>
+              <a:rPr lang="en-US"/>
               <a:t>Click to edit Master text styles</a:t>
             </a:r>
           </a:p>
@@ -5900,7 +5896,7 @@
             <a:fld id="{1D8BD707-D9CF-40AE-B4C6-C98DA3205C09}" type="datetimeFigureOut">
               <a:rPr lang="en-US" smtClean="0"/>
               <a:pPr/>
-              <a:t>9/12/2015</a:t>
+              <a:t>9/16/2016</a:t>
             </a:fld>
             <a:endParaRPr lang="en-US"/>
           </a:p>
@@ -6005,10 +6001,9 @@
           <a:lstStyle/>
           <a:p>
             <a:r>
-              <a:rPr lang="en-US" smtClean="0"/>
+              <a:rPr lang="en-US"/>
               <a:t>Click to edit Master title style</a:t>
             </a:r>
-            <a:endParaRPr lang="en-US"/>
           </a:p>
         </p:txBody>
       </p:sp>
@@ -6039,38 +6034,37 @@
           <a:p>
             <a:pPr lvl="0"/>
             <a:r>
-              <a:rPr lang="en-US" smtClean="0"/>
+              <a:rPr lang="en-US"/>
               <a:t>Click to edit Master text styles</a:t>
             </a:r>
           </a:p>
           <a:p>
             <a:pPr lvl="1"/>
             <a:r>
-              <a:rPr lang="en-US" smtClean="0"/>
+              <a:rPr lang="en-US"/>
               <a:t>Second level</a:t>
             </a:r>
           </a:p>
           <a:p>
             <a:pPr lvl="2"/>
             <a:r>
-              <a:rPr lang="en-US" smtClean="0"/>
+              <a:rPr lang="en-US"/>
               <a:t>Third level</a:t>
             </a:r>
           </a:p>
           <a:p>
             <a:pPr lvl="3"/>
             <a:r>
-              <a:rPr lang="en-US" smtClean="0"/>
+              <a:rPr lang="en-US"/>
               <a:t>Fourth level</a:t>
             </a:r>
           </a:p>
           <a:p>
             <a:pPr lvl="4"/>
             <a:r>
-              <a:rPr lang="en-US" smtClean="0"/>
+              <a:rPr lang="en-US"/>
               <a:t>Fifth level</a:t>
             </a:r>
-            <a:endParaRPr lang="en-US"/>
           </a:p>
         </p:txBody>
       </p:sp>
@@ -6110,7 +6104,7 @@
             <a:fld id="{1D8BD707-D9CF-40AE-B4C6-C98DA3205C09}" type="datetimeFigureOut">
               <a:rPr lang="en-US" smtClean="0"/>
               <a:pPr/>
-              <a:t>9/12/2015</a:t>
+              <a:t>9/16/2016</a:t>
             </a:fld>
             <a:endParaRPr lang="en-US"/>
           </a:p>
@@ -6504,19 +6498,19 @@
           <a:lstStyle/>
           <a:p>
             <a:r>
-              <a:rPr lang="en-US" dirty="0" smtClean="0"/>
+              <a:rPr lang="en-US" dirty="0"/>
               <a:t>Inheritance</a:t>
             </a:r>
           </a:p>
           <a:p>
             <a:r>
-              <a:rPr lang="en-US" dirty="0" smtClean="0"/>
+              <a:rPr lang="en-US" dirty="0"/>
               <a:t>Object</a:t>
             </a:r>
           </a:p>
           <a:p>
             <a:r>
-              <a:rPr lang="en-US" dirty="0" smtClean="0"/>
+              <a:rPr lang="en-US" dirty="0"/>
               <a:t>== vs .equals</a:t>
             </a:r>
           </a:p>
@@ -6674,10 +6668,9 @@
           <a:lstStyle/>
           <a:p>
             <a:r>
-              <a:rPr lang="en-US" dirty="0" smtClean="0"/>
+              <a:rPr lang="en-US" dirty="0"/>
               <a:t>Shape</a:t>
             </a:r>
-            <a:endParaRPr lang="en-US" dirty="0"/>
           </a:p>
         </p:txBody>
       </p:sp>
@@ -6704,18 +6697,17 @@
           <a:lstStyle/>
           <a:p>
             <a:r>
-              <a:rPr lang="en-US" dirty="0" smtClean="0"/>
+              <a:rPr lang="en-US" dirty="0"/>
               <a:t>abstract double </a:t>
             </a:r>
             <a:r>
-              <a:rPr lang="en-US" dirty="0" err="1" smtClean="0"/>
+              <a:rPr lang="en-US" dirty="0" err="1"/>
               <a:t>getArea</a:t>
             </a:r>
             <a:r>
-              <a:rPr lang="en-US" dirty="0" smtClean="0"/>
+              <a:rPr lang="en-US" dirty="0"/>
               <a:t>()</a:t>
             </a:r>
-            <a:endParaRPr lang="en-US" dirty="0"/>
           </a:p>
         </p:txBody>
       </p:sp>
@@ -6741,36 +6733,35 @@
           <a:lstStyle/>
           <a:p>
             <a:r>
-              <a:rPr lang="en-US" dirty="0" smtClean="0"/>
+              <a:rPr lang="en-US" dirty="0"/>
               <a:t>abstract double </a:t>
             </a:r>
             <a:r>
-              <a:rPr lang="en-US" dirty="0" err="1" smtClean="0"/>
+              <a:rPr lang="en-US" dirty="0" err="1"/>
               <a:t>getCicumference</a:t>
             </a:r>
             <a:r>
-              <a:rPr lang="en-US" dirty="0" smtClean="0"/>
+              <a:rPr lang="en-US" dirty="0"/>
               <a:t>()</a:t>
             </a:r>
           </a:p>
           <a:p>
             <a:r>
-              <a:rPr lang="en-US" dirty="0" err="1" smtClean="0"/>
+              <a:rPr lang="en-US" dirty="0" err="1"/>
               <a:t>int</a:t>
             </a:r>
             <a:r>
-              <a:rPr lang="en-US" dirty="0" smtClean="0"/>
+              <a:rPr lang="en-US" dirty="0"/>
               <a:t> </a:t>
             </a:r>
             <a:r>
-              <a:rPr lang="en-US" dirty="0" err="1" smtClean="0"/>
+              <a:rPr lang="en-US" dirty="0" err="1"/>
               <a:t>compareTo</a:t>
             </a:r>
             <a:r>
-              <a:rPr lang="en-US" dirty="0" smtClean="0"/>
+              <a:rPr lang="en-US" dirty="0"/>
               <a:t>(Shape)</a:t>
             </a:r>
-            <a:endParaRPr lang="en-US" dirty="0"/>
           </a:p>
         </p:txBody>
       </p:sp>
@@ -6797,10 +6788,9 @@
           <a:lstStyle/>
           <a:p>
             <a:r>
-              <a:rPr lang="en-US" dirty="0" smtClean="0"/>
+              <a:rPr lang="en-US" dirty="0"/>
               <a:t>Circle</a:t>
             </a:r>
-            <a:endParaRPr lang="en-US" dirty="0"/>
           </a:p>
         </p:txBody>
       </p:sp>
@@ -6827,7 +6817,7 @@
           <a:lstStyle/>
           <a:p>
             <a:r>
-              <a:rPr lang="en-US" dirty="0" err="1" smtClean="0">
+              <a:rPr lang="en-US" dirty="0" err="1">
                 <a:solidFill>
                   <a:srgbClr val="FF0000"/>
                 </a:solidFill>
@@ -6933,7 +6923,7 @@
           <a:lstStyle/>
           <a:p>
             <a:r>
-              <a:rPr lang="en-US" dirty="0" err="1" smtClean="0">
+              <a:rPr lang="en-US" dirty="0" err="1">
                 <a:solidFill>
                   <a:srgbClr val="FF0000"/>
                 </a:solidFill>
@@ -6971,10 +6961,9 @@
           <a:lstStyle/>
           <a:p>
             <a:r>
-              <a:rPr lang="en-US" dirty="0" smtClean="0"/>
+              <a:rPr lang="en-US" dirty="0"/>
               <a:t>radius</a:t>
             </a:r>
-            <a:endParaRPr lang="en-US" dirty="0"/>
           </a:p>
         </p:txBody>
       </p:sp>
@@ -7034,10 +7023,9 @@
           <a:lstStyle/>
           <a:p>
             <a:r>
-              <a:rPr lang="en-US" smtClean="0"/>
+              <a:rPr lang="en-US"/>
               <a:t>overrides</a:t>
             </a:r>
-            <a:endParaRPr lang="en-US"/>
           </a:p>
         </p:txBody>
       </p:sp>
@@ -7063,14 +7051,13 @@
           <a:lstStyle/>
           <a:p>
             <a:r>
-              <a:rPr lang="en-US" dirty="0" err="1" smtClean="0"/>
+              <a:rPr lang="en-US" dirty="0" err="1"/>
               <a:t>getArea</a:t>
             </a:r>
             <a:r>
-              <a:rPr lang="en-US" dirty="0" smtClean="0"/>
+              <a:rPr lang="en-US" dirty="0"/>
               <a:t>()</a:t>
             </a:r>
-            <a:endParaRPr lang="en-US" dirty="0"/>
           </a:p>
         </p:txBody>
       </p:sp>
@@ -7096,14 +7083,13 @@
           <a:lstStyle/>
           <a:p>
             <a:r>
-              <a:rPr lang="en-US" dirty="0" err="1" smtClean="0"/>
+              <a:rPr lang="en-US" dirty="0" err="1"/>
               <a:t>getCicumference</a:t>
             </a:r>
             <a:r>
-              <a:rPr lang="en-US" dirty="0" smtClean="0"/>
+              <a:rPr lang="en-US" dirty="0"/>
               <a:t>()</a:t>
             </a:r>
-            <a:endParaRPr lang="en-US" dirty="0"/>
           </a:p>
         </p:txBody>
       </p:sp>
@@ -7163,7 +7149,7 @@
           <a:lstStyle/>
           <a:p>
             <a:r>
-              <a:rPr lang="en-US" dirty="0" err="1" smtClean="0"/>
+              <a:rPr lang="en-US" dirty="0" err="1"/>
               <a:t>RegularPentagon</a:t>
             </a:r>
             <a:endParaRPr lang="en-US" dirty="0"/>
@@ -7226,7 +7212,7 @@
           <a:lstStyle/>
           <a:p>
             <a:r>
-              <a:rPr lang="en-US" dirty="0" err="1" smtClean="0">
+              <a:rPr lang="en-US" dirty="0" err="1">
                 <a:solidFill>
                   <a:srgbClr val="FF0000"/>
                 </a:solidFill>
@@ -7264,7 +7250,7 @@
           <a:lstStyle/>
           <a:p>
             <a:r>
-              <a:rPr lang="en-US" dirty="0" err="1" smtClean="0"/>
+              <a:rPr lang="en-US" dirty="0" err="1"/>
               <a:t>sideLength</a:t>
             </a:r>
             <a:endParaRPr lang="en-US" dirty="0"/>
@@ -7327,10 +7313,9 @@
           <a:lstStyle/>
           <a:p>
             <a:r>
-              <a:rPr lang="en-US" smtClean="0"/>
+              <a:rPr lang="en-US"/>
               <a:t>overrides</a:t>
             </a:r>
-            <a:endParaRPr lang="en-US"/>
           </a:p>
         </p:txBody>
       </p:sp>
@@ -7356,14 +7341,13 @@
           <a:lstStyle/>
           <a:p>
             <a:r>
-              <a:rPr lang="en-US" dirty="0" err="1" smtClean="0"/>
+              <a:rPr lang="en-US" dirty="0" err="1"/>
               <a:t>getArea</a:t>
             </a:r>
             <a:r>
-              <a:rPr lang="en-US" dirty="0" smtClean="0"/>
+              <a:rPr lang="en-US" dirty="0"/>
               <a:t>()</a:t>
             </a:r>
-            <a:endParaRPr lang="en-US" dirty="0"/>
           </a:p>
         </p:txBody>
       </p:sp>
@@ -7389,14 +7373,13 @@
           <a:lstStyle/>
           <a:p>
             <a:r>
-              <a:rPr lang="en-US" dirty="0" err="1" smtClean="0"/>
+              <a:rPr lang="en-US" dirty="0" err="1"/>
               <a:t>getCicumference</a:t>
             </a:r>
             <a:r>
-              <a:rPr lang="en-US" dirty="0" smtClean="0"/>
+              <a:rPr lang="en-US" dirty="0"/>
               <a:t>()</a:t>
             </a:r>
-            <a:endParaRPr lang="en-US" dirty="0"/>
           </a:p>
         </p:txBody>
       </p:sp>
@@ -7456,7 +7439,7 @@
           <a:lstStyle/>
           <a:p>
             <a:r>
-              <a:rPr lang="en-US" dirty="0" smtClean="0">
+              <a:rPr lang="en-US" dirty="0">
                 <a:solidFill>
                   <a:srgbClr val="FF0000"/>
                 </a:solidFill>
@@ -7464,10 +7447,9 @@
               <a:t>implements</a:t>
             </a:r>
             <a:r>
-              <a:rPr lang="en-US" dirty="0" smtClean="0"/>
+              <a:rPr lang="en-US" dirty="0"/>
               <a:t> </a:t>
             </a:r>
-            <a:endParaRPr lang="en-US" dirty="0"/>
           </a:p>
         </p:txBody>
       </p:sp>
@@ -7494,10 +7476,9 @@
           <a:lstStyle/>
           <a:p>
             <a:r>
-              <a:rPr lang="en-US" dirty="0" smtClean="0"/>
+              <a:rPr lang="en-US" dirty="0"/>
               <a:t>Comparable&lt;Shape&gt;</a:t>
             </a:r>
-            <a:endParaRPr lang="en-US" dirty="0"/>
           </a:p>
         </p:txBody>
       </p:sp>
@@ -7553,22 +7534,21 @@
           <a:lstStyle/>
           <a:p>
             <a:r>
-              <a:rPr lang="en-US" dirty="0" err="1" smtClean="0"/>
+              <a:rPr lang="en-US" dirty="0" err="1"/>
               <a:t>int</a:t>
             </a:r>
             <a:r>
-              <a:rPr lang="en-US" dirty="0" smtClean="0"/>
+              <a:rPr lang="en-US" dirty="0"/>
               <a:t> </a:t>
             </a:r>
             <a:r>
-              <a:rPr lang="en-US" dirty="0" err="1" smtClean="0"/>
+              <a:rPr lang="en-US" dirty="0" err="1"/>
               <a:t>compareTo</a:t>
             </a:r>
             <a:r>
-              <a:rPr lang="en-US" dirty="0" smtClean="0"/>
+              <a:rPr lang="en-US" dirty="0"/>
               <a:t>(Shape)</a:t>
             </a:r>
-            <a:endParaRPr lang="en-US" dirty="0"/>
           </a:p>
         </p:txBody>
       </p:sp>
@@ -7637,7 +7617,7 @@
           <a:lstStyle/>
           <a:p>
             <a:r>
-              <a:rPr lang="en-US" dirty="0" err="1" smtClean="0">
+              <a:rPr lang="en-US" dirty="0" err="1">
                 <a:solidFill>
                   <a:srgbClr val="FF0000"/>
                 </a:solidFill>
@@ -7675,32 +7655,31 @@
           <a:lstStyle/>
           <a:p>
             <a:r>
-              <a:rPr lang="en-US" dirty="0" smtClean="0"/>
+              <a:rPr lang="en-US" dirty="0"/>
               <a:t>Circle and </a:t>
             </a:r>
             <a:r>
-              <a:rPr lang="en-US" dirty="0" err="1" smtClean="0"/>
+              <a:rPr lang="en-US" dirty="0" err="1"/>
               <a:t>RegularPentagon</a:t>
             </a:r>
             <a:r>
-              <a:rPr lang="en-US" dirty="0" smtClean="0"/>
+              <a:rPr lang="en-US" dirty="0"/>
               <a:t> will inherit </a:t>
             </a:r>
             <a:r>
-              <a:rPr lang="en-US" dirty="0" err="1" smtClean="0"/>
+              <a:rPr lang="en-US" dirty="0" err="1"/>
               <a:t>compareTo</a:t>
             </a:r>
             <a:r>
-              <a:rPr lang="en-US" dirty="0" smtClean="0"/>
+              <a:rPr lang="en-US" dirty="0"/>
               <a:t>() </a:t>
             </a:r>
           </a:p>
           <a:p>
             <a:r>
-              <a:rPr lang="en-US" dirty="0" smtClean="0"/>
+              <a:rPr lang="en-US" dirty="0"/>
               <a:t>(and hence will be Comparable) </a:t>
             </a:r>
-            <a:endParaRPr lang="en-US" dirty="0"/>
           </a:p>
         </p:txBody>
       </p:sp>
@@ -7908,19 +7887,19 @@
           <a:lstStyle/>
           <a:p>
             <a:r>
-              <a:rPr lang="en-US" dirty="0" smtClean="0"/>
+              <a:rPr lang="en-US" dirty="0"/>
               <a:t>Circle and </a:t>
             </a:r>
             <a:r>
-              <a:rPr lang="en-US" dirty="0" err="1" smtClean="0"/>
+              <a:rPr lang="en-US" dirty="0" err="1"/>
               <a:t>RegularPentagon</a:t>
             </a:r>
             <a:r>
-              <a:rPr lang="en-US" dirty="0" smtClean="0"/>
+              <a:rPr lang="en-US" dirty="0"/>
               <a:t> </a:t>
             </a:r>
             <a:r>
-              <a:rPr lang="en-US" dirty="0" smtClean="0">
+              <a:rPr lang="en-US" dirty="0">
                 <a:solidFill>
                   <a:srgbClr val="FF0000"/>
                 </a:solidFill>
@@ -7928,17 +7907,17 @@
               <a:t>extend</a:t>
             </a:r>
             <a:r>
-              <a:rPr lang="en-US" dirty="0" smtClean="0"/>
+              <a:rPr lang="en-US" dirty="0"/>
               <a:t> Shape</a:t>
             </a:r>
           </a:p>
           <a:p>
             <a:r>
-              <a:rPr lang="en-US" dirty="0" smtClean="0"/>
+              <a:rPr lang="en-US" dirty="0"/>
               <a:t>Shape </a:t>
             </a:r>
             <a:r>
-              <a:rPr lang="en-US" dirty="0" smtClean="0">
+              <a:rPr lang="en-US" dirty="0">
                 <a:solidFill>
                   <a:srgbClr val="FF0000"/>
                 </a:solidFill>
@@ -7946,25 +7925,25 @@
               <a:t>implements</a:t>
             </a:r>
             <a:r>
-              <a:rPr lang="en-US" dirty="0" smtClean="0"/>
+              <a:rPr lang="en-US" dirty="0"/>
               <a:t> Comparable</a:t>
             </a:r>
           </a:p>
           <a:p>
             <a:r>
-              <a:rPr lang="en-US" dirty="0" smtClean="0"/>
+              <a:rPr lang="en-US" dirty="0"/>
               <a:t>Circle and </a:t>
             </a:r>
             <a:r>
-              <a:rPr lang="en-US" dirty="0" err="1" smtClean="0"/>
+              <a:rPr lang="en-US" dirty="0" err="1"/>
               <a:t>RegularPentagon</a:t>
             </a:r>
             <a:r>
-              <a:rPr lang="en-US" dirty="0" smtClean="0"/>
+              <a:rPr lang="en-US" dirty="0"/>
               <a:t> </a:t>
             </a:r>
             <a:r>
-              <a:rPr lang="en-US" dirty="0" smtClean="0">
+              <a:rPr lang="en-US" dirty="0">
                 <a:solidFill>
                   <a:srgbClr val="FF0000"/>
                 </a:solidFill>
@@ -7972,13 +7951,13 @@
               <a:t>inherit</a:t>
             </a:r>
             <a:r>
-              <a:rPr lang="en-US" dirty="0" smtClean="0"/>
+              <a:rPr lang="en-US" dirty="0"/>
               <a:t> the</a:t>
             </a:r>
           </a:p>
           <a:p>
             <a:r>
-              <a:rPr lang="en-US" dirty="0" smtClean="0"/>
+              <a:rPr lang="en-US" dirty="0"/>
               <a:t>Implementation of Comparable</a:t>
             </a:r>
           </a:p>
@@ -8064,11 +8043,11 @@
           <a:lstStyle/>
           <a:p>
             <a:r>
-              <a:rPr lang="en-US" dirty="0" smtClean="0"/>
+              <a:rPr lang="en-US" dirty="0"/>
               <a:t>Having defined a </a:t>
             </a:r>
             <a:r>
-              <a:rPr lang="en-US" dirty="0" smtClean="0">
+              <a:rPr lang="en-US" dirty="0">
                 <a:solidFill>
                   <a:srgbClr val="FF0000"/>
                 </a:solidFill>
@@ -8076,18 +8055,17 @@
               <a:t>natural order</a:t>
             </a:r>
             <a:r>
-              <a:rPr lang="en-US" dirty="0" smtClean="0"/>
+              <a:rPr lang="en-US" dirty="0"/>
               <a:t>, we can now call </a:t>
             </a:r>
             <a:r>
-              <a:rPr lang="en-US" dirty="0" err="1" smtClean="0"/>
+              <a:rPr lang="en-US" dirty="0" err="1"/>
               <a:t>Collections.sort</a:t>
             </a:r>
             <a:r>
-              <a:rPr lang="en-US" dirty="0" smtClean="0"/>
+              <a:rPr lang="en-US" dirty="0"/>
               <a:t>(…)</a:t>
             </a:r>
-            <a:endParaRPr lang="en-US" dirty="0"/>
           </a:p>
         </p:txBody>
       </p:sp>
@@ -8234,19 +8212,19 @@
           <a:lstStyle/>
           <a:p>
             <a:r>
-              <a:rPr lang="en-US" dirty="0" smtClean="0"/>
+              <a:rPr lang="en-US" dirty="0"/>
               <a:t>Inheritance</a:t>
             </a:r>
           </a:p>
           <a:p>
             <a:r>
-              <a:rPr lang="en-US" dirty="0" smtClean="0"/>
+              <a:rPr lang="en-US" dirty="0"/>
               <a:t>Object</a:t>
             </a:r>
           </a:p>
           <a:p>
             <a:r>
-              <a:rPr lang="en-US" dirty="0" smtClean="0"/>
+              <a:rPr lang="en-US" dirty="0"/>
               <a:t>== vs .equals</a:t>
             </a:r>
           </a:p>
@@ -8333,10 +8311,9 @@
           <a:lstStyle/>
           <a:p>
             <a:r>
-              <a:rPr lang="en-US" dirty="0" smtClean="0"/>
+              <a:rPr lang="en-US" dirty="0"/>
               <a:t>In Java (and C#) all objects automatically extend Object</a:t>
             </a:r>
-            <a:endParaRPr lang="en-US" dirty="0"/>
           </a:p>
         </p:txBody>
       </p:sp>
@@ -8482,10 +8459,9 @@
           <a:lstStyle/>
           <a:p>
             <a:r>
-              <a:rPr lang="en-US" dirty="0" smtClean="0"/>
+              <a:rPr lang="en-US" dirty="0"/>
               <a:t>All objects have these methods…</a:t>
             </a:r>
-            <a:endParaRPr lang="en-US" dirty="0"/>
           </a:p>
         </p:txBody>
       </p:sp>
@@ -8512,18 +8488,17 @@
           <a:lstStyle/>
           <a:p>
             <a:r>
-              <a:rPr lang="en-US" dirty="0" smtClean="0"/>
+              <a:rPr lang="en-US" dirty="0"/>
               <a:t>wait() and notify() and </a:t>
             </a:r>
             <a:r>
-              <a:rPr lang="en-US" dirty="0" err="1" smtClean="0"/>
+              <a:rPr lang="en-US" dirty="0" err="1"/>
               <a:t>notifyAll</a:t>
             </a:r>
             <a:r>
-              <a:rPr lang="en-US" dirty="0" smtClean="0"/>
+              <a:rPr lang="en-US" dirty="0"/>
               <a:t>() are for threading (so we will get to them later)</a:t>
             </a:r>
-            <a:endParaRPr lang="en-US" dirty="0"/>
           </a:p>
         </p:txBody>
       </p:sp>
@@ -8550,35 +8525,34 @@
           <a:lstStyle/>
           <a:p>
             <a:r>
-              <a:rPr lang="en-US" dirty="0" smtClean="0"/>
+              <a:rPr lang="en-US" dirty="0"/>
               <a:t>clone() is very tricky to use (see Bloch Item #11: Override clone judiciously)</a:t>
             </a:r>
           </a:p>
           <a:p>
-            <a:endParaRPr lang="en-US" dirty="0" smtClean="0"/>
-          </a:p>
-          <a:p>
-            <a:r>
-              <a:rPr lang="en-US" dirty="0" smtClean="0"/>
+            <a:endParaRPr lang="en-US" dirty="0"/>
+          </a:p>
+          <a:p>
+            <a:r>
+              <a:rPr lang="en-US" dirty="0"/>
               <a:t>The 3 that we will think about now are: equals(…), </a:t>
             </a:r>
             <a:r>
-              <a:rPr lang="en-US" dirty="0" err="1" smtClean="0"/>
+              <a:rPr lang="en-US" dirty="0" err="1"/>
               <a:t>hashCode</a:t>
             </a:r>
             <a:r>
-              <a:rPr lang="en-US" dirty="0" smtClean="0"/>
+              <a:rPr lang="en-US" dirty="0"/>
               <a:t>(..) and </a:t>
             </a:r>
             <a:r>
-              <a:rPr lang="en-US" dirty="0" err="1" smtClean="0"/>
+              <a:rPr lang="en-US" dirty="0" err="1"/>
               <a:t>toString</a:t>
             </a:r>
             <a:r>
-              <a:rPr lang="en-US" dirty="0" smtClean="0"/>
+              <a:rPr lang="en-US" dirty="0"/>
               <a:t>(…)</a:t>
             </a:r>
-            <a:endParaRPr lang="en-US" dirty="0"/>
           </a:p>
         </p:txBody>
       </p:sp>
@@ -8630,31 +8604,30 @@
           <a:lstStyle/>
           <a:p>
             <a:r>
-              <a:rPr lang="en-US" dirty="0" err="1" smtClean="0"/>
+              <a:rPr lang="en-US" dirty="0" err="1"/>
               <a:t>toString</a:t>
             </a:r>
             <a:r>
-              <a:rPr lang="en-US" dirty="0" smtClean="0"/>
+              <a:rPr lang="en-US" dirty="0"/>
               <a:t>() is the easiest to understand…</a:t>
             </a:r>
           </a:p>
           <a:p>
-            <a:endParaRPr lang="en-US" dirty="0" smtClean="0"/>
-          </a:p>
-          <a:p>
-            <a:r>
-              <a:rPr lang="en-US" dirty="0" smtClean="0"/>
+            <a:endParaRPr lang="en-US" dirty="0"/>
+          </a:p>
+          <a:p>
+            <a:r>
+              <a:rPr lang="en-US" dirty="0"/>
               <a:t>In the Object </a:t>
             </a:r>
             <a:r>
-              <a:rPr lang="en-US" dirty="0" err="1" smtClean="0"/>
+              <a:rPr lang="en-US" dirty="0" err="1"/>
               <a:t>superclass</a:t>
             </a:r>
             <a:r>
-              <a:rPr lang="en-US" dirty="0" smtClean="0"/>
+              <a:rPr lang="en-US" dirty="0"/>
               <a:t>….</a:t>
             </a:r>
-            <a:endParaRPr lang="en-US" dirty="0"/>
           </a:p>
         </p:txBody>
       </p:sp>
@@ -8738,18 +8711,17 @@
           <a:lstStyle/>
           <a:p>
             <a:r>
-              <a:rPr lang="en-US" dirty="0" smtClean="0"/>
+              <a:rPr lang="en-US" dirty="0"/>
               <a:t>So </a:t>
             </a:r>
             <a:r>
-              <a:rPr lang="en-US" dirty="0" err="1" smtClean="0"/>
+              <a:rPr lang="en-US" dirty="0" err="1"/>
               <a:t>toString</a:t>
             </a:r>
             <a:r>
-              <a:rPr lang="en-US" dirty="0" smtClean="0"/>
+              <a:rPr lang="en-US" dirty="0"/>
               <a:t>() in our Shape class is not very informative by default</a:t>
             </a:r>
-            <a:endParaRPr lang="en-US" dirty="0"/>
           </a:p>
         </p:txBody>
       </p:sp>
@@ -8873,34 +8845,33 @@
           <a:lstStyle/>
           <a:p>
             <a:r>
-              <a:rPr lang="en-US" dirty="0" smtClean="0"/>
+              <a:rPr lang="en-US" dirty="0"/>
               <a:t>Shape is here </a:t>
             </a:r>
             <a:r>
-              <a:rPr lang="en-US" dirty="0" err="1" smtClean="0"/>
+              <a:rPr lang="en-US" dirty="0" err="1"/>
               <a:t>autocast</a:t>
             </a:r>
             <a:r>
-              <a:rPr lang="en-US" dirty="0" smtClean="0"/>
+              <a:rPr lang="en-US" dirty="0"/>
               <a:t> to a String (by calling </a:t>
             </a:r>
             <a:r>
-              <a:rPr lang="en-US" dirty="0" err="1" smtClean="0"/>
+              <a:rPr lang="en-US" dirty="0" err="1"/>
               <a:t>s.toString</a:t>
             </a:r>
             <a:r>
-              <a:rPr lang="en-US" dirty="0" smtClean="0"/>
+              <a:rPr lang="en-US" dirty="0"/>
               <a:t>() for each s in in </a:t>
             </a:r>
             <a:r>
-              <a:rPr lang="en-US" dirty="0" err="1" smtClean="0"/>
+              <a:rPr lang="en-US" dirty="0" err="1"/>
               <a:t>listOfShapes</a:t>
             </a:r>
             <a:r>
-              <a:rPr lang="en-US" dirty="0" smtClean="0"/>
+              <a:rPr lang="en-US" dirty="0"/>
               <a:t>)</a:t>
             </a:r>
-            <a:endParaRPr lang="en-US" dirty="0"/>
           </a:p>
         </p:txBody>
       </p:sp>
@@ -8984,18 +8955,17 @@
           <a:lstStyle/>
           <a:p>
             <a:r>
-              <a:rPr lang="en-US" dirty="0" smtClean="0"/>
+              <a:rPr lang="en-US" dirty="0"/>
               <a:t>Explicitly calling </a:t>
             </a:r>
             <a:r>
-              <a:rPr lang="en-US" dirty="0" err="1" smtClean="0"/>
+              <a:rPr lang="en-US" dirty="0" err="1"/>
               <a:t>toString</a:t>
             </a:r>
             <a:r>
-              <a:rPr lang="en-US" dirty="0" smtClean="0"/>
+              <a:rPr lang="en-US" dirty="0"/>
               <a:t>() yields the same results…</a:t>
             </a:r>
-            <a:endParaRPr lang="en-US" dirty="0"/>
           </a:p>
         </p:txBody>
       </p:sp>
@@ -9112,18 +9082,17 @@
           <a:lstStyle/>
           <a:p>
             <a:r>
-              <a:rPr lang="en-US" dirty="0" smtClean="0"/>
+              <a:rPr lang="en-US" dirty="0"/>
               <a:t>It is considered good form to override </a:t>
             </a:r>
             <a:r>
-              <a:rPr lang="en-US" dirty="0" err="1" smtClean="0"/>
+              <a:rPr lang="en-US" dirty="0" err="1"/>
               <a:t>toString</a:t>
             </a:r>
             <a:r>
-              <a:rPr lang="en-US" dirty="0" smtClean="0"/>
+              <a:rPr lang="en-US" dirty="0"/>
               <a:t>() </a:t>
             </a:r>
-            <a:endParaRPr lang="en-US" dirty="0"/>
           </a:p>
         </p:txBody>
       </p:sp>
@@ -9182,35 +9151,35 @@
           <a:lstStyle/>
           <a:p>
             <a:r>
-              <a:rPr lang="en-US" dirty="0" smtClean="0"/>
+              <a:rPr lang="en-US" dirty="0"/>
               <a:t>override is when the subclass defines the method with the same name</a:t>
             </a:r>
           </a:p>
           <a:p>
             <a:r>
-              <a:rPr lang="en-US" dirty="0" smtClean="0"/>
+              <a:rPr lang="en-US" dirty="0"/>
               <a:t>in the </a:t>
             </a:r>
             <a:r>
-              <a:rPr lang="en-US" dirty="0" err="1" smtClean="0"/>
+              <a:rPr lang="en-US" dirty="0" err="1"/>
               <a:t>superclass</a:t>
             </a:r>
             <a:r>
-              <a:rPr lang="en-US" dirty="0" smtClean="0"/>
+              <a:rPr lang="en-US" dirty="0"/>
               <a:t>.</a:t>
             </a:r>
           </a:p>
           <a:p>
-            <a:endParaRPr lang="en-US" dirty="0" smtClean="0"/>
-          </a:p>
-          <a:p>
-            <a:r>
-              <a:rPr lang="en-US" dirty="0" smtClean="0"/>
+            <a:endParaRPr lang="en-US" dirty="0"/>
+          </a:p>
+          <a:p>
+            <a:r>
+              <a:rPr lang="en-US" dirty="0"/>
               <a:t>The method gets executed from the subclass.</a:t>
             </a:r>
           </a:p>
           <a:p>
-            <a:endParaRPr lang="en-US" dirty="0" smtClean="0"/>
+            <a:endParaRPr lang="en-US" dirty="0"/>
           </a:p>
           <a:p>
             <a:endParaRPr lang="en-US" dirty="0"/>
@@ -9265,7 +9234,7 @@
           <a:lstStyle/>
           <a:p>
             <a:r>
-              <a:rPr lang="en-US" dirty="0" smtClean="0">
+              <a:rPr lang="en-US" dirty="0">
                 <a:solidFill>
                   <a:srgbClr val="FF0000"/>
                 </a:solidFill>
@@ -9273,16 +9242,16 @@
               <a:t>Interfaces</a:t>
             </a:r>
             <a:r>
-              <a:rPr lang="en-US" dirty="0" smtClean="0"/>
+              <a:rPr lang="en-US" dirty="0"/>
               <a:t> are one way we can work at a more abstract level in Java</a:t>
             </a:r>
           </a:p>
           <a:p>
-            <a:endParaRPr lang="en-US" dirty="0" smtClean="0"/>
-          </a:p>
-          <a:p>
-            <a:r>
-              <a:rPr lang="en-US" dirty="0" smtClean="0">
+            <a:endParaRPr lang="en-US" dirty="0"/>
+          </a:p>
+          <a:p>
+            <a:r>
+              <a:rPr lang="en-US" dirty="0">
                 <a:solidFill>
                   <a:srgbClr val="FF0000"/>
                 </a:solidFill>
@@ -9290,20 +9259,20 @@
               <a:t>Inheritance</a:t>
             </a:r>
             <a:r>
-              <a:rPr lang="en-US" dirty="0" smtClean="0"/>
+              <a:rPr lang="en-US" dirty="0"/>
               <a:t> is another.</a:t>
             </a:r>
           </a:p>
           <a:p>
-            <a:endParaRPr lang="en-US" dirty="0" smtClean="0"/>
-          </a:p>
-          <a:p>
-            <a:r>
-              <a:rPr lang="en-US" dirty="0" smtClean="0"/>
+            <a:endParaRPr lang="en-US" dirty="0"/>
+          </a:p>
+          <a:p>
+            <a:r>
+              <a:rPr lang="en-US" dirty="0"/>
               <a:t>Instead of declaring Shape to be an </a:t>
             </a:r>
             <a:r>
-              <a:rPr lang="en-US" dirty="0" smtClean="0">
+              <a:rPr lang="en-US" dirty="0">
                 <a:solidFill>
                   <a:srgbClr val="FF0000"/>
                 </a:solidFill>
@@ -9311,13 +9280,13 @@
               <a:t>interface</a:t>
             </a:r>
             <a:r>
-              <a:rPr lang="en-US" dirty="0" smtClean="0"/>
+              <a:rPr lang="en-US" dirty="0"/>
               <a:t> we can make it an</a:t>
             </a:r>
           </a:p>
           <a:p>
             <a:r>
-              <a:rPr lang="en-US" dirty="0" smtClean="0">
+              <a:rPr lang="en-US" dirty="0">
                 <a:solidFill>
                   <a:srgbClr val="FF0000"/>
                 </a:solidFill>
@@ -9325,11 +9294,11 @@
               <a:t>abstract class </a:t>
             </a:r>
             <a:r>
-              <a:rPr lang="en-US" dirty="0" smtClean="0"/>
+              <a:rPr lang="en-US" dirty="0"/>
               <a:t>and have our Shapes </a:t>
             </a:r>
             <a:r>
-              <a:rPr lang="en-US" dirty="0" smtClean="0">
+              <a:rPr lang="en-US" dirty="0">
                 <a:solidFill>
                   <a:srgbClr val="FF0000"/>
                 </a:solidFill>
@@ -9337,7 +9306,7 @@
               <a:t>extend</a:t>
             </a:r>
             <a:r>
-              <a:rPr lang="en-US" dirty="0" smtClean="0"/>
+              <a:rPr lang="en-US" dirty="0"/>
               <a:t> it..</a:t>
             </a:r>
           </a:p>
@@ -9391,18 +9360,17 @@
           <a:lstStyle/>
           <a:p>
             <a:r>
-              <a:rPr lang="en-US" dirty="0" smtClean="0"/>
+              <a:rPr lang="en-US" dirty="0"/>
               <a:t>We can have Shape override </a:t>
             </a:r>
             <a:r>
-              <a:rPr lang="en-US" dirty="0" err="1" smtClean="0"/>
+              <a:rPr lang="en-US" dirty="0" err="1"/>
               <a:t>toString</a:t>
             </a:r>
             <a:r>
-              <a:rPr lang="en-US" dirty="0" smtClean="0"/>
+              <a:rPr lang="en-US" dirty="0"/>
               <a:t>()…</a:t>
             </a:r>
-            <a:endParaRPr lang="en-US" dirty="0"/>
           </a:p>
         </p:txBody>
       </p:sp>
@@ -9527,26 +9495,25 @@
           <a:lstStyle/>
           <a:p>
             <a:r>
-              <a:rPr lang="en-US" dirty="0" smtClean="0"/>
+              <a:rPr lang="en-US" dirty="0"/>
               <a:t>“@Override” is a note to the compiler that say, do not compile unless </a:t>
             </a:r>
             <a:r>
-              <a:rPr lang="en-US" dirty="0" err="1" smtClean="0"/>
+              <a:rPr lang="en-US" dirty="0" err="1"/>
               <a:t>toString</a:t>
             </a:r>
             <a:r>
-              <a:rPr lang="en-US" dirty="0" smtClean="0"/>
+              <a:rPr lang="en-US" dirty="0"/>
               <a:t>()  is a method that is overriding a method in the </a:t>
             </a:r>
             <a:r>
-              <a:rPr lang="en-US" dirty="0" err="1" smtClean="0"/>
+              <a:rPr lang="en-US" dirty="0" err="1"/>
               <a:t>superclass</a:t>
             </a:r>
             <a:r>
-              <a:rPr lang="en-US" dirty="0" smtClean="0"/>
+              <a:rPr lang="en-US" dirty="0"/>
               <a:t>… </a:t>
             </a:r>
-            <a:endParaRPr lang="en-US" dirty="0"/>
           </a:p>
         </p:txBody>
       </p:sp>
@@ -9630,26 +9597,25 @@
           <a:lstStyle/>
           <a:p>
             <a:r>
-              <a:rPr lang="en-US" dirty="0" smtClean="0"/>
+              <a:rPr lang="en-US" dirty="0"/>
               <a:t>With </a:t>
             </a:r>
             <a:r>
-              <a:rPr lang="en-US" dirty="0" err="1" smtClean="0"/>
+              <a:rPr lang="en-US" dirty="0" err="1"/>
               <a:t>toString</a:t>
             </a:r>
             <a:r>
-              <a:rPr lang="en-US" dirty="0" smtClean="0"/>
+              <a:rPr lang="en-US" dirty="0"/>
               <a:t>() </a:t>
             </a:r>
             <a:r>
-              <a:rPr lang="en-US" dirty="0" err="1" smtClean="0"/>
+              <a:rPr lang="en-US" dirty="0" err="1"/>
               <a:t>overriden</a:t>
             </a:r>
             <a:r>
-              <a:rPr lang="en-US" dirty="0" smtClean="0"/>
+              <a:rPr lang="en-US" dirty="0"/>
               <a:t> in Shape…  </a:t>
             </a:r>
-            <a:endParaRPr lang="en-US" dirty="0"/>
           </a:p>
         </p:txBody>
       </p:sp>
@@ -9827,18 +9793,17 @@
           <a:lstStyle/>
           <a:p>
             <a:r>
-              <a:rPr lang="en-US" dirty="0" smtClean="0"/>
+              <a:rPr lang="en-US" dirty="0"/>
               <a:t>I can define </a:t>
             </a:r>
             <a:r>
-              <a:rPr lang="en-US" dirty="0" err="1" smtClean="0"/>
+              <a:rPr lang="en-US" dirty="0" err="1"/>
               <a:t>toString</a:t>
             </a:r>
             <a:r>
-              <a:rPr lang="en-US" dirty="0" smtClean="0"/>
+              <a:rPr lang="en-US" dirty="0"/>
               <a:t>() in Circle</a:t>
             </a:r>
-            <a:endParaRPr lang="en-US" dirty="0"/>
           </a:p>
         </p:txBody>
       </p:sp>
@@ -9957,53 +9922,52 @@
           <a:lstStyle/>
           <a:p>
             <a:r>
-              <a:rPr lang="en-US" dirty="0" err="1" smtClean="0"/>
+              <a:rPr lang="en-US" dirty="0" err="1"/>
               <a:t>RegularPentagon</a:t>
             </a:r>
             <a:r>
-              <a:rPr lang="en-US" dirty="0" smtClean="0"/>
+              <a:rPr lang="en-US" dirty="0"/>
               <a:t> just calls </a:t>
             </a:r>
             <a:r>
-              <a:rPr lang="en-US" dirty="0" err="1" smtClean="0"/>
+              <a:rPr lang="en-US" dirty="0" err="1"/>
               <a:t>Shape.toString</a:t>
             </a:r>
             <a:r>
-              <a:rPr lang="en-US" dirty="0" smtClean="0"/>
+              <a:rPr lang="en-US" dirty="0"/>
               <a:t>()</a:t>
             </a:r>
           </a:p>
           <a:p>
             <a:r>
-              <a:rPr lang="en-US" dirty="0" smtClean="0"/>
+              <a:rPr lang="en-US" dirty="0"/>
               <a:t>(because there is no </a:t>
             </a:r>
             <a:r>
-              <a:rPr lang="en-US" dirty="0" err="1" smtClean="0"/>
+              <a:rPr lang="en-US" dirty="0" err="1"/>
               <a:t>RegularPentagon.toString</a:t>
             </a:r>
             <a:r>
-              <a:rPr lang="en-US" dirty="0" smtClean="0"/>
+              <a:rPr lang="en-US" dirty="0"/>
               <a:t>()</a:t>
             </a:r>
           </a:p>
           <a:p>
-            <a:endParaRPr lang="en-US" dirty="0" smtClean="0"/>
-          </a:p>
-          <a:p>
-            <a:r>
-              <a:rPr lang="en-US" dirty="0" smtClean="0"/>
+            <a:endParaRPr lang="en-US" dirty="0"/>
+          </a:p>
+          <a:p>
+            <a:r>
+              <a:rPr lang="en-US" dirty="0"/>
               <a:t>Circle calls </a:t>
             </a:r>
             <a:r>
-              <a:rPr lang="en-US" dirty="0" err="1" smtClean="0"/>
+              <a:rPr lang="en-US" dirty="0" err="1"/>
               <a:t>Circle.toString</a:t>
             </a:r>
             <a:r>
-              <a:rPr lang="en-US" dirty="0" smtClean="0"/>
+              <a:rPr lang="en-US" dirty="0"/>
               <a:t>() </a:t>
             </a:r>
-            <a:endParaRPr lang="en-US" dirty="0"/>
           </a:p>
         </p:txBody>
       </p:sp>
@@ -10095,18 +10059,17 @@
           <a:lstStyle/>
           <a:p>
             <a:r>
-              <a:rPr lang="en-US" dirty="0" smtClean="0"/>
+              <a:rPr lang="en-US" dirty="0"/>
               <a:t>Calls </a:t>
             </a:r>
             <a:r>
-              <a:rPr lang="en-US" dirty="0" err="1" smtClean="0"/>
+              <a:rPr lang="en-US" dirty="0" err="1"/>
               <a:t>shape.toString</a:t>
             </a:r>
             <a:r>
-              <a:rPr lang="en-US" dirty="0" smtClean="0"/>
+              <a:rPr lang="en-US" dirty="0"/>
               <a:t>()</a:t>
             </a:r>
-            <a:endParaRPr lang="en-US" dirty="0"/>
           </a:p>
         </p:txBody>
       </p:sp>
@@ -10222,19 +10185,19 @@
           <a:lstStyle/>
           <a:p>
             <a:r>
-              <a:rPr lang="en-US" dirty="0" smtClean="0"/>
+              <a:rPr lang="en-US" dirty="0"/>
               <a:t>We add to </a:t>
             </a:r>
             <a:r>
-              <a:rPr lang="en-US" dirty="0" err="1" smtClean="0"/>
+              <a:rPr lang="en-US" dirty="0" err="1"/>
               <a:t>toString</a:t>
             </a:r>
             <a:r>
-              <a:rPr lang="en-US" dirty="0" smtClean="0"/>
+              <a:rPr lang="en-US" dirty="0"/>
               <a:t>() to </a:t>
             </a:r>
             <a:r>
-              <a:rPr lang="en-US" dirty="0" err="1" smtClean="0"/>
+              <a:rPr lang="en-US" dirty="0" err="1"/>
               <a:t>RegularPetagon</a:t>
             </a:r>
             <a:endParaRPr lang="en-US" dirty="0"/>
@@ -10356,10 +10319,9 @@
           <a:lstStyle/>
           <a:p>
             <a:r>
-              <a:rPr lang="en-US" dirty="0" smtClean="0"/>
+              <a:rPr lang="en-US" dirty="0"/>
               <a:t>Now we get a more consistent output… </a:t>
             </a:r>
-            <a:endParaRPr lang="en-US" dirty="0"/>
           </a:p>
         </p:txBody>
       </p:sp>
@@ -10475,18 +10437,17 @@
           <a:lstStyle/>
           <a:p>
             <a:r>
-              <a:rPr lang="en-US" dirty="0" smtClean="0"/>
+              <a:rPr lang="en-US" dirty="0"/>
               <a:t>If we override </a:t>
             </a:r>
             <a:r>
-              <a:rPr lang="en-US" dirty="0" err="1" smtClean="0"/>
+              <a:rPr lang="en-US" dirty="0" err="1"/>
               <a:t>toString</a:t>
             </a:r>
             <a:r>
-              <a:rPr lang="en-US" dirty="0" smtClean="0"/>
+              <a:rPr lang="en-US" dirty="0"/>
               <a:t>() properly, we can simplify some our client code…</a:t>
             </a:r>
-            <a:endParaRPr lang="en-US" dirty="0"/>
           </a:p>
         </p:txBody>
       </p:sp>
@@ -10545,10 +10506,9 @@
           <a:lstStyle/>
           <a:p>
             <a:r>
-              <a:rPr lang="en-US" dirty="0" smtClean="0"/>
+              <a:rPr lang="en-US" dirty="0"/>
               <a:t>for example could become…. </a:t>
             </a:r>
-            <a:endParaRPr lang="en-US" dirty="0"/>
           </a:p>
         </p:txBody>
       </p:sp>
@@ -10607,10 +10567,9 @@
           <a:lstStyle/>
           <a:p>
             <a:r>
-              <a:rPr lang="en-US" dirty="0" smtClean="0"/>
+              <a:rPr lang="en-US" dirty="0"/>
               <a:t>(but of course this assumes there is one way proper way to format object information)</a:t>
             </a:r>
-            <a:endParaRPr lang="en-US" dirty="0"/>
           </a:p>
         </p:txBody>
       </p:sp>
@@ -10662,23 +10621,18 @@
           <a:lstStyle/>
           <a:p>
             <a:r>
-              <a:rPr lang="en-US" dirty="0" smtClean="0"/>
+              <a:rPr lang="en-US" dirty="0"/>
               <a:t>Inheritance can reduce the amount of work you need to do by utilizing code reuse.</a:t>
             </a:r>
           </a:p>
           <a:p>
-            <a:r>
-              <a:rPr lang="en-US" dirty="0" smtClean="0"/>
-              <a:t/>
-            </a:r>
             <a:br>
-              <a:rPr lang="en-US" dirty="0" smtClean="0"/>
+              <a:rPr lang="en-US" dirty="0"/>
             </a:br>
             <a:r>
-              <a:rPr lang="en-US" dirty="0" smtClean="0"/>
+              <a:rPr lang="en-US" dirty="0"/>
               <a:t>Consider Rectangle and Square… </a:t>
             </a:r>
-            <a:endParaRPr lang="en-US" dirty="0"/>
           </a:p>
         </p:txBody>
       </p:sp>
@@ -10776,10 +10730,9 @@
           <a:lstStyle/>
           <a:p>
             <a:r>
-              <a:rPr lang="en-US" dirty="0" smtClean="0"/>
+              <a:rPr lang="en-US" dirty="0"/>
               <a:t>Shape</a:t>
             </a:r>
-            <a:endParaRPr lang="en-US" dirty="0"/>
           </a:p>
         </p:txBody>
       </p:sp>
@@ -10806,18 +10759,17 @@
           <a:lstStyle/>
           <a:p>
             <a:r>
-              <a:rPr lang="en-US" dirty="0" smtClean="0"/>
+              <a:rPr lang="en-US" dirty="0"/>
               <a:t>abstract double </a:t>
             </a:r>
             <a:r>
-              <a:rPr lang="en-US" dirty="0" err="1" smtClean="0"/>
+              <a:rPr lang="en-US" dirty="0" err="1"/>
               <a:t>getArea</a:t>
             </a:r>
             <a:r>
-              <a:rPr lang="en-US" dirty="0" smtClean="0"/>
+              <a:rPr lang="en-US" dirty="0"/>
               <a:t>()</a:t>
             </a:r>
-            <a:endParaRPr lang="en-US" dirty="0"/>
           </a:p>
         </p:txBody>
       </p:sp>
@@ -10843,36 +10795,35 @@
           <a:lstStyle/>
           <a:p>
             <a:r>
-              <a:rPr lang="en-US" dirty="0" smtClean="0"/>
+              <a:rPr lang="en-US" dirty="0"/>
               <a:t>abstract double </a:t>
             </a:r>
             <a:r>
-              <a:rPr lang="en-US" dirty="0" err="1" smtClean="0"/>
+              <a:rPr lang="en-US" dirty="0" err="1"/>
               <a:t>getCicumference</a:t>
             </a:r>
             <a:r>
-              <a:rPr lang="en-US" dirty="0" smtClean="0"/>
+              <a:rPr lang="en-US" dirty="0"/>
               <a:t>()</a:t>
             </a:r>
           </a:p>
           <a:p>
             <a:r>
-              <a:rPr lang="en-US" dirty="0" err="1" smtClean="0"/>
+              <a:rPr lang="en-US" dirty="0" err="1"/>
               <a:t>int</a:t>
             </a:r>
             <a:r>
-              <a:rPr lang="en-US" dirty="0" smtClean="0"/>
+              <a:rPr lang="en-US" dirty="0"/>
               <a:t> </a:t>
             </a:r>
             <a:r>
-              <a:rPr lang="en-US" dirty="0" err="1" smtClean="0"/>
+              <a:rPr lang="en-US" dirty="0" err="1"/>
               <a:t>compareTo</a:t>
             </a:r>
             <a:r>
-              <a:rPr lang="en-US" dirty="0" smtClean="0"/>
+              <a:rPr lang="en-US" dirty="0"/>
               <a:t>(Shape)</a:t>
             </a:r>
-            <a:endParaRPr lang="en-US" dirty="0"/>
           </a:p>
         </p:txBody>
       </p:sp>
@@ -10899,10 +10850,9 @@
           <a:lstStyle/>
           <a:p>
             <a:r>
-              <a:rPr lang="en-US" dirty="0" smtClean="0"/>
+              <a:rPr lang="en-US" dirty="0"/>
               <a:t>Circle</a:t>
             </a:r>
-            <a:endParaRPr lang="en-US" dirty="0"/>
           </a:p>
         </p:txBody>
       </p:sp>
@@ -10929,7 +10879,7 @@
           <a:lstStyle/>
           <a:p>
             <a:r>
-              <a:rPr lang="en-US" dirty="0" err="1" smtClean="0">
+              <a:rPr lang="en-US" dirty="0" err="1">
                 <a:solidFill>
                   <a:srgbClr val="FF0000"/>
                 </a:solidFill>
@@ -11035,7 +10985,7 @@
           <a:lstStyle/>
           <a:p>
             <a:r>
-              <a:rPr lang="en-US" dirty="0" err="1" smtClean="0"/>
+              <a:rPr lang="en-US" dirty="0" err="1"/>
               <a:t>RegularPentagon</a:t>
             </a:r>
             <a:endParaRPr lang="en-US" dirty="0"/>
@@ -11098,7 +11048,7 @@
           <a:lstStyle/>
           <a:p>
             <a:r>
-              <a:rPr lang="en-US" dirty="0" smtClean="0">
+              <a:rPr lang="en-US" dirty="0">
                 <a:solidFill>
                   <a:srgbClr val="FF0000"/>
                 </a:solidFill>
@@ -11106,10 +11056,9 @@
               <a:t>implements</a:t>
             </a:r>
             <a:r>
-              <a:rPr lang="en-US" dirty="0" smtClean="0"/>
+              <a:rPr lang="en-US" dirty="0"/>
               <a:t> </a:t>
             </a:r>
-            <a:endParaRPr lang="en-US" dirty="0"/>
           </a:p>
         </p:txBody>
       </p:sp>
@@ -11136,10 +11085,9 @@
           <a:lstStyle/>
           <a:p>
             <a:r>
-              <a:rPr lang="en-US" dirty="0" smtClean="0"/>
+              <a:rPr lang="en-US" dirty="0"/>
               <a:t>Comparable&lt;Shape&gt;</a:t>
             </a:r>
-            <a:endParaRPr lang="en-US" dirty="0"/>
           </a:p>
         </p:txBody>
       </p:sp>
@@ -11195,22 +11143,21 @@
           <a:lstStyle/>
           <a:p>
             <a:r>
-              <a:rPr lang="en-US" dirty="0" err="1" smtClean="0"/>
+              <a:rPr lang="en-US" dirty="0" err="1"/>
               <a:t>int</a:t>
             </a:r>
             <a:r>
-              <a:rPr lang="en-US" dirty="0" smtClean="0"/>
+              <a:rPr lang="en-US" dirty="0"/>
               <a:t> </a:t>
             </a:r>
             <a:r>
-              <a:rPr lang="en-US" dirty="0" err="1" smtClean="0"/>
+              <a:rPr lang="en-US" dirty="0" err="1"/>
               <a:t>compareTo</a:t>
             </a:r>
             <a:r>
-              <a:rPr lang="en-US" dirty="0" smtClean="0"/>
+              <a:rPr lang="en-US" dirty="0"/>
               <a:t>(Shape)</a:t>
             </a:r>
-            <a:endParaRPr lang="en-US" dirty="0"/>
           </a:p>
         </p:txBody>
       </p:sp>
@@ -11279,7 +11226,7 @@
           <a:lstStyle/>
           <a:p>
             <a:r>
-              <a:rPr lang="en-US" dirty="0" err="1" smtClean="0">
+              <a:rPr lang="en-US" dirty="0" err="1">
                 <a:solidFill>
                   <a:srgbClr val="FF0000"/>
                 </a:solidFill>
@@ -11317,10 +11264,9 @@
           <a:lstStyle/>
           <a:p>
             <a:r>
-              <a:rPr lang="en-US" dirty="0" smtClean="0"/>
+              <a:rPr lang="en-US" dirty="0"/>
               <a:t>Rectangle</a:t>
             </a:r>
-            <a:endParaRPr lang="en-US" dirty="0"/>
           </a:p>
         </p:txBody>
       </p:sp>
@@ -11382,7 +11328,7 @@
           <a:lstStyle/>
           <a:p>
             <a:r>
-              <a:rPr lang="en-US" dirty="0" err="1" smtClean="0">
+              <a:rPr lang="en-US" dirty="0" err="1">
                 <a:solidFill>
                   <a:srgbClr val="FF0000"/>
                 </a:solidFill>
@@ -11453,7 +11399,7 @@
           <a:lstStyle/>
           <a:p>
             <a:r>
-              <a:rPr lang="en-US" dirty="0" err="1" smtClean="0">
+              <a:rPr lang="en-US" dirty="0" err="1">
                 <a:solidFill>
                   <a:srgbClr val="FF0000"/>
                 </a:solidFill>
@@ -11491,10 +11437,9 @@
           <a:lstStyle/>
           <a:p>
             <a:r>
-              <a:rPr lang="en-US" dirty="0" smtClean="0"/>
+              <a:rPr lang="en-US" dirty="0"/>
               <a:t>Square</a:t>
             </a:r>
-            <a:endParaRPr lang="en-US" dirty="0"/>
           </a:p>
         </p:txBody>
       </p:sp>
@@ -11578,10 +11523,9 @@
           <a:lstStyle/>
           <a:p>
             <a:r>
-              <a:rPr lang="en-US" dirty="0" smtClean="0"/>
+              <a:rPr lang="en-US" dirty="0"/>
               <a:t>Here is a Rectangle</a:t>
             </a:r>
-            <a:endParaRPr lang="en-US" dirty="0"/>
           </a:p>
         </p:txBody>
       </p:sp>
@@ -11665,10 +11609,9 @@
           <a:lstStyle/>
           <a:p>
             <a:r>
-              <a:rPr lang="en-US" dirty="0" smtClean="0"/>
+              <a:rPr lang="en-US" dirty="0"/>
               <a:t>Here is a Rectangle</a:t>
             </a:r>
-            <a:endParaRPr lang="en-US" dirty="0"/>
           </a:p>
         </p:txBody>
       </p:sp>
@@ -11725,10 +11668,9 @@
           <a:lstStyle/>
           <a:p>
             <a:r>
-              <a:rPr lang="en-US" dirty="0" smtClean="0"/>
+              <a:rPr lang="en-US" dirty="0"/>
               <a:t>The Square can be gotten with almost no work</a:t>
             </a:r>
-            <a:endParaRPr lang="en-US" dirty="0"/>
           </a:p>
         </p:txBody>
       </p:sp>
@@ -11787,18 +11729,17 @@
           <a:lstStyle/>
           <a:p>
             <a:r>
-              <a:rPr lang="en-US" dirty="0" smtClean="0"/>
+              <a:rPr lang="en-US" dirty="0"/>
               <a:t>(although it might be “polite” to override </a:t>
             </a:r>
             <a:r>
-              <a:rPr lang="en-US" dirty="0" err="1" smtClean="0"/>
+              <a:rPr lang="en-US" dirty="0" err="1"/>
               <a:t>toString</a:t>
             </a:r>
             <a:r>
-              <a:rPr lang="en-US" dirty="0" smtClean="0"/>
+              <a:rPr lang="en-US" dirty="0"/>
               <a:t>() in Square too)</a:t>
             </a:r>
-            <a:endParaRPr lang="en-US" dirty="0"/>
           </a:p>
         </p:txBody>
       </p:sp>
@@ -11914,10 +11855,9 @@
           <a:lstStyle/>
           <a:p>
             <a:r>
-              <a:rPr lang="en-US" dirty="0" smtClean="0"/>
+              <a:rPr lang="en-US" dirty="0"/>
               <a:t>We can mix our new Rectangles and Squares with other Shapes…</a:t>
             </a:r>
-            <a:endParaRPr lang="en-US" dirty="0"/>
           </a:p>
         </p:txBody>
       </p:sp>
@@ -11977,26 +11917,25 @@
           <a:lstStyle/>
           <a:p>
             <a:r>
-              <a:rPr lang="en-US" dirty="0" smtClean="0"/>
+              <a:rPr lang="en-US" dirty="0"/>
               <a:t>Because we didn’t over-ride </a:t>
             </a:r>
             <a:r>
-              <a:rPr lang="en-US" dirty="0" err="1" smtClean="0"/>
+              <a:rPr lang="en-US" dirty="0" err="1"/>
               <a:t>toString</a:t>
             </a:r>
             <a:r>
-              <a:rPr lang="en-US" dirty="0" smtClean="0"/>
+              <a:rPr lang="en-US" dirty="0"/>
               <a:t>() in Square, </a:t>
             </a:r>
             <a:r>
-              <a:rPr lang="en-US" dirty="0" err="1" smtClean="0"/>
+              <a:rPr lang="en-US" dirty="0" err="1"/>
               <a:t>toString</a:t>
             </a:r>
             <a:r>
-              <a:rPr lang="en-US" dirty="0" smtClean="0"/>
+              <a:rPr lang="en-US" dirty="0"/>
               <a:t>() from Rectangle is used here…</a:t>
             </a:r>
-            <a:endParaRPr lang="en-US" dirty="0"/>
           </a:p>
         </p:txBody>
       </p:sp>
@@ -12048,38 +11987,35 @@
           <a:lstStyle/>
           <a:p>
             <a:r>
-              <a:rPr lang="en-US" dirty="0" smtClean="0"/>
+              <a:rPr lang="en-US" dirty="0"/>
               <a:t>On the one hand, inheritance can make good use of code re-use.</a:t>
             </a:r>
           </a:p>
           <a:p>
-            <a:endParaRPr lang="en-US" dirty="0" smtClean="0"/>
-          </a:p>
-          <a:p>
-            <a:r>
-              <a:rPr lang="en-US" dirty="0" smtClean="0"/>
-              <a:t>On the other hand, it breaks </a:t>
-            </a:r>
-            <a:r>
-              <a:rPr lang="en-US" dirty="0" err="1" smtClean="0"/>
-              <a:t>encapsalation</a:t>
-            </a:r>
-            <a:r>
-              <a:rPr lang="en-US" dirty="0" smtClean="0"/>
-              <a:t>.</a:t>
-            </a:r>
-          </a:p>
-          <a:p>
-            <a:endParaRPr lang="en-US" dirty="0" smtClean="0"/>
-          </a:p>
-          <a:p>
-            <a:r>
-              <a:rPr lang="en-US" dirty="0" smtClean="0"/>
+            <a:endParaRPr lang="en-US" dirty="0"/>
+          </a:p>
+          <a:p>
+            <a:r>
+              <a:rPr lang="en-US" dirty="0"/>
+              <a:t>On the other hand, it </a:t>
+            </a:r>
+            <a:r>
+              <a:rPr lang="en-US"/>
+              <a:t>breaks encapsulation.</a:t>
+            </a:r>
+            <a:endParaRPr lang="en-US" dirty="0"/>
+          </a:p>
+          <a:p>
+            <a:endParaRPr lang="en-US" dirty="0"/>
+          </a:p>
+          <a:p>
+            <a:r>
+              <a:rPr lang="en-US" dirty="0"/>
               <a:t>The way that Square works is dependent on the way Rectangle works.</a:t>
             </a:r>
           </a:p>
           <a:p>
-            <a:endParaRPr lang="en-US" dirty="0" smtClean="0"/>
+            <a:endParaRPr lang="en-US" dirty="0"/>
           </a:p>
         </p:txBody>
       </p:sp>
@@ -12138,22 +12074,21 @@
           <a:lstStyle/>
           <a:p>
             <a:r>
-              <a:rPr lang="en-US" dirty="0" smtClean="0"/>
+              <a:rPr lang="en-US" dirty="0"/>
               <a:t>Bloch has a lot to say about</a:t>
             </a:r>
           </a:p>
           <a:p>
             <a:r>
-              <a:rPr lang="en-US" dirty="0" smtClean="0"/>
+              <a:rPr lang="en-US" dirty="0"/>
               <a:t>this, that we will talk about</a:t>
             </a:r>
           </a:p>
           <a:p>
             <a:r>
-              <a:rPr lang="en-US" dirty="0" smtClean="0"/>
+              <a:rPr lang="en-US" dirty="0"/>
               <a:t>more later in the semester….</a:t>
             </a:r>
-            <a:endParaRPr lang="en-US" dirty="0"/>
           </a:p>
         </p:txBody>
       </p:sp>
@@ -12238,18 +12173,13 @@
           <a:lstStyle/>
           <a:p>
             <a:r>
-              <a:rPr lang="en-US" dirty="0" smtClean="0">
+              <a:rPr lang="en-US" dirty="0">
                 <a:solidFill>
                   <a:srgbClr val="FF0000"/>
                 </a:solidFill>
               </a:rPr>
               <a:t>With an interface….</a:t>
             </a:r>
-            <a:endParaRPr lang="en-US" dirty="0">
-              <a:solidFill>
-                <a:srgbClr val="FF0000"/>
-              </a:solidFill>
-            </a:endParaRPr>
           </a:p>
         </p:txBody>
       </p:sp>
@@ -12432,11 +12362,11 @@
           <a:lstStyle/>
           <a:p>
             <a:r>
-              <a:rPr lang="en-US" dirty="0" smtClean="0"/>
+              <a:rPr lang="en-US" dirty="0"/>
               <a:t>Circle</a:t>
             </a:r>
             <a:r>
-              <a:rPr lang="en-US" dirty="0" smtClean="0">
+              <a:rPr lang="en-US" dirty="0">
                 <a:solidFill>
                   <a:srgbClr val="FF0000"/>
                 </a:solidFill>
@@ -12444,10 +12374,9 @@
               <a:t> implements </a:t>
             </a:r>
             <a:r>
-              <a:rPr lang="en-US" dirty="0" smtClean="0"/>
+              <a:rPr lang="en-US" dirty="0"/>
               <a:t>Shape</a:t>
             </a:r>
-            <a:endParaRPr lang="en-US" dirty="0"/>
           </a:p>
         </p:txBody>
       </p:sp>
@@ -12507,17 +12436,17 @@
           <a:lstStyle/>
           <a:p>
             <a:r>
-              <a:rPr lang="en-US" dirty="0" err="1" smtClean="0"/>
+              <a:rPr lang="en-US" dirty="0" err="1"/>
               <a:t>RegularPentagaon</a:t>
             </a:r>
             <a:r>
-              <a:rPr lang="en-US" dirty="0" smtClean="0"/>
+              <a:rPr lang="en-US" dirty="0"/>
               <a:t> </a:t>
             </a:r>
           </a:p>
           <a:p>
             <a:r>
-              <a:rPr lang="en-US" dirty="0" smtClean="0">
+              <a:rPr lang="en-US" dirty="0">
                 <a:solidFill>
                   <a:srgbClr val="FF0000"/>
                 </a:solidFill>
@@ -12525,10 +12454,9 @@
               <a:t>implements</a:t>
             </a:r>
             <a:r>
-              <a:rPr lang="en-US" dirty="0" smtClean="0"/>
+              <a:rPr lang="en-US" dirty="0"/>
               <a:t> Shape</a:t>
             </a:r>
-            <a:endParaRPr lang="en-US" dirty="0"/>
           </a:p>
         </p:txBody>
       </p:sp>
@@ -12613,19 +12541,19 @@
           <a:lstStyle/>
           <a:p>
             <a:r>
-              <a:rPr lang="en-US" dirty="0" smtClean="0"/>
+              <a:rPr lang="en-US" dirty="0"/>
               <a:t>Inheritance</a:t>
             </a:r>
           </a:p>
           <a:p>
             <a:r>
-              <a:rPr lang="en-US" dirty="0" smtClean="0"/>
+              <a:rPr lang="en-US" dirty="0"/>
               <a:t>Object</a:t>
             </a:r>
           </a:p>
           <a:p>
             <a:r>
-              <a:rPr lang="en-US" dirty="0" smtClean="0"/>
+              <a:rPr lang="en-US" dirty="0"/>
               <a:t>== vs .equals</a:t>
             </a:r>
           </a:p>
@@ -12712,10 +12640,9 @@
           <a:lstStyle/>
           <a:p>
             <a:r>
-              <a:rPr lang="en-US" dirty="0" smtClean="0"/>
+              <a:rPr lang="en-US" dirty="0"/>
               <a:t>== works differently for primitive types and objects..</a:t>
             </a:r>
-            <a:endParaRPr lang="en-US" dirty="0"/>
           </a:p>
         </p:txBody>
       </p:sp>
@@ -12806,10 +12733,9 @@
           <a:lstStyle/>
           <a:p>
             <a:r>
-              <a:rPr lang="en-US" dirty="0" smtClean="0"/>
+              <a:rPr lang="en-US" dirty="0"/>
               <a:t>For primitives == compares the values of the variables</a:t>
             </a:r>
-            <a:endParaRPr lang="en-US" dirty="0"/>
           </a:p>
         </p:txBody>
       </p:sp>
@@ -12930,22 +12856,21 @@
           <a:lstStyle/>
           <a:p>
             <a:r>
-              <a:rPr lang="en-US" dirty="0" smtClean="0"/>
+              <a:rPr lang="en-US" dirty="0"/>
               <a:t>For objects, == checks if the objects have the same memory address</a:t>
             </a:r>
           </a:p>
           <a:p>
             <a:r>
-              <a:rPr lang="en-US" dirty="0" smtClean="0"/>
+              <a:rPr lang="en-US" dirty="0"/>
               <a:t>not the value of the objects..</a:t>
             </a:r>
           </a:p>
           <a:p>
             <a:r>
-              <a:rPr lang="en-US" dirty="0" smtClean="0"/>
+              <a:rPr lang="en-US" dirty="0"/>
               <a:t>(This is a common Java interview question…)</a:t>
             </a:r>
-            <a:endParaRPr lang="en-US" dirty="0"/>
           </a:p>
         </p:txBody>
       </p:sp>
@@ -13029,14 +12954,13 @@
           <a:lstStyle/>
           <a:p>
             <a:r>
-              <a:rPr lang="en-US" dirty="0" smtClean="0"/>
+              <a:rPr lang="en-US" dirty="0"/>
               <a:t>.equals() tests whether the value of two objects is </a:t>
             </a:r>
             <a:r>
-              <a:rPr lang="en-US" smtClean="0"/>
+              <a:rPr lang="en-US"/>
               <a:t>the same…</a:t>
             </a:r>
-            <a:endParaRPr lang="en-US"/>
           </a:p>
         </p:txBody>
       </p:sp>
@@ -13214,16 +13138,15 @@
           <a:lstStyle/>
           <a:p>
             <a:r>
-              <a:rPr lang="en-US" dirty="0" smtClean="0"/>
+              <a:rPr lang="en-US" dirty="0"/>
               <a:t>.equals is part of Object.  By default it returns the same as the operator.</a:t>
             </a:r>
           </a:p>
           <a:p>
             <a:r>
-              <a:rPr lang="en-US" dirty="0" smtClean="0"/>
+              <a:rPr lang="en-US" dirty="0"/>
               <a:t>So if your don’t override .equals, then .equals and == will be the same. </a:t>
             </a:r>
-            <a:endParaRPr lang="en-US" dirty="0"/>
           </a:p>
         </p:txBody>
       </p:sp>
@@ -13314,10 +13237,9 @@
           <a:lstStyle/>
           <a:p>
             <a:r>
-              <a:rPr lang="en-US" dirty="0" smtClean="0"/>
+              <a:rPr lang="en-US" dirty="0"/>
               <a:t>In the Object source code</a:t>
             </a:r>
-            <a:endParaRPr lang="en-US" dirty="0"/>
           </a:p>
         </p:txBody>
       </p:sp>
@@ -13434,25 +13356,25 @@
           <a:lstStyle/>
           <a:p>
             <a:r>
-              <a:rPr lang="en-US" dirty="0" smtClean="0"/>
+              <a:rPr lang="en-US" dirty="0"/>
               <a:t>Bloch has a lot to say about these.  We will come back to this when we have</a:t>
             </a:r>
           </a:p>
           <a:p>
             <a:r>
-              <a:rPr lang="en-US" dirty="0" smtClean="0"/>
+              <a:rPr lang="en-US" dirty="0"/>
               <a:t>talked more about </a:t>
             </a:r>
             <a:r>
-              <a:rPr lang="en-US" dirty="0" err="1" smtClean="0"/>
+              <a:rPr lang="en-US" dirty="0" err="1"/>
               <a:t>HashSet</a:t>
             </a:r>
             <a:r>
-              <a:rPr lang="en-US" dirty="0" smtClean="0"/>
+              <a:rPr lang="en-US" dirty="0"/>
               <a:t> and </a:t>
             </a:r>
             <a:r>
-              <a:rPr lang="en-US" dirty="0" err="1" smtClean="0"/>
+              <a:rPr lang="en-US" dirty="0" err="1"/>
               <a:t>HashMap</a:t>
             </a:r>
             <a:endParaRPr lang="en-US" dirty="0"/>
@@ -13572,16 +13494,15 @@
           <a:lstStyle/>
           <a:p>
             <a:r>
-              <a:rPr lang="en-US" dirty="0" smtClean="0"/>
+              <a:rPr lang="en-US" dirty="0"/>
               <a:t>String overrides .equals (which is why string1 == string2 is not the same as</a:t>
             </a:r>
           </a:p>
           <a:p>
             <a:r>
-              <a:rPr lang="en-US" dirty="0" smtClean="0"/>
+              <a:rPr lang="en-US" dirty="0"/>
               <a:t>string1.equals(string2)</a:t>
             </a:r>
-            <a:endParaRPr lang="en-US" dirty="0"/>
           </a:p>
         </p:txBody>
       </p:sp>
@@ -13727,18 +13648,17 @@
           <a:lstStyle/>
           <a:p>
             <a:r>
-              <a:rPr lang="en-US" dirty="0" smtClean="0"/>
+              <a:rPr lang="en-US" dirty="0"/>
               <a:t>We can look at the source code for </a:t>
             </a:r>
             <a:r>
-              <a:rPr lang="en-US" dirty="0" err="1" smtClean="0"/>
+              <a:rPr lang="en-US" dirty="0" err="1"/>
               <a:t>String.equals</a:t>
             </a:r>
             <a:r>
-              <a:rPr lang="en-US" dirty="0" smtClean="0"/>
+              <a:rPr lang="en-US" dirty="0"/>
               <a:t>() to see how it works…</a:t>
             </a:r>
-            <a:endParaRPr lang="en-US" dirty="0"/>
           </a:p>
         </p:txBody>
       </p:sp>
@@ -13798,16 +13718,15 @@
           <a:lstStyle/>
           <a:p>
             <a:r>
-              <a:rPr lang="en-US" dirty="0" smtClean="0"/>
+              <a:rPr lang="en-US" dirty="0"/>
               <a:t>If the two objects are the same</a:t>
             </a:r>
           </a:p>
           <a:p>
             <a:r>
-              <a:rPr lang="en-US" dirty="0" smtClean="0"/>
+              <a:rPr lang="en-US" dirty="0"/>
               <a:t>object in memory, they are equal</a:t>
             </a:r>
-            <a:endParaRPr lang="en-US" dirty="0"/>
           </a:p>
         </p:txBody>
       </p:sp>
@@ -13867,28 +13786,27 @@
           <a:lstStyle/>
           <a:p>
             <a:r>
-              <a:rPr lang="en-US" dirty="0" smtClean="0"/>
+              <a:rPr lang="en-US" dirty="0"/>
               <a:t>If the other</a:t>
             </a:r>
           </a:p>
           <a:p>
             <a:r>
-              <a:rPr lang="en-US" dirty="0" smtClean="0"/>
+              <a:rPr lang="en-US" dirty="0"/>
               <a:t>Object is not a</a:t>
             </a:r>
           </a:p>
           <a:p>
             <a:r>
-              <a:rPr lang="en-US" dirty="0" smtClean="0"/>
+              <a:rPr lang="en-US" dirty="0"/>
               <a:t>String they are not</a:t>
             </a:r>
           </a:p>
           <a:p>
             <a:r>
-              <a:rPr lang="en-US" dirty="0" smtClean="0"/>
+              <a:rPr lang="en-US" dirty="0"/>
               <a:t>equal</a:t>
             </a:r>
-            <a:endParaRPr lang="en-US" dirty="0"/>
           </a:p>
         </p:txBody>
       </p:sp>
@@ -13948,16 +13866,15 @@
           <a:lstStyle/>
           <a:p>
             <a:r>
-              <a:rPr lang="en-US" dirty="0" smtClean="0"/>
+              <a:rPr lang="en-US" dirty="0"/>
               <a:t>If the two Strings have a </a:t>
             </a:r>
           </a:p>
           <a:p>
             <a:r>
-              <a:rPr lang="en-US" dirty="0" smtClean="0"/>
+              <a:rPr lang="en-US" dirty="0"/>
               <a:t>different length, they are not equal</a:t>
             </a:r>
-            <a:endParaRPr lang="en-US" dirty="0"/>
           </a:p>
         </p:txBody>
       </p:sp>
@@ -14017,16 +13934,15 @@
           <a:lstStyle/>
           <a:p>
             <a:r>
-              <a:rPr lang="en-US" dirty="0" smtClean="0"/>
+              <a:rPr lang="en-US" dirty="0"/>
               <a:t>If the two strings do not have a character in</a:t>
             </a:r>
           </a:p>
           <a:p>
             <a:r>
-              <a:rPr lang="en-US" dirty="0" smtClean="0"/>
+              <a:rPr lang="en-US" dirty="0"/>
               <a:t>common, they are not equal</a:t>
             </a:r>
-            <a:endParaRPr lang="en-US" dirty="0"/>
           </a:p>
         </p:txBody>
       </p:sp>
@@ -14078,98 +13994,98 @@
           <a:lstStyle/>
           <a:p>
             <a:r>
-              <a:rPr lang="en-US" dirty="0" smtClean="0"/>
+              <a:rPr lang="en-US" dirty="0"/>
               <a:t>Next time:</a:t>
             </a:r>
           </a:p>
           <a:p>
             <a:r>
-              <a:rPr lang="en-US" dirty="0" smtClean="0"/>
+              <a:rPr lang="en-US" dirty="0"/>
               <a:t>	</a:t>
             </a:r>
             <a:r>
-              <a:rPr lang="en-US" dirty="0" err="1" smtClean="0"/>
+              <a:rPr lang="en-US" dirty="0" err="1"/>
               <a:t>FastaSequence</a:t>
             </a:r>
             <a:r>
-              <a:rPr lang="en-US" dirty="0" smtClean="0"/>
+              <a:rPr lang="en-US" dirty="0"/>
               <a:t> as a </a:t>
             </a:r>
             <a:r>
-              <a:rPr lang="en-US" dirty="0" err="1" smtClean="0"/>
+              <a:rPr lang="en-US" dirty="0" err="1"/>
               <a:t>superclass</a:t>
             </a:r>
             <a:r>
-              <a:rPr lang="en-US" dirty="0" smtClean="0"/>
+              <a:rPr lang="en-US" dirty="0"/>
               <a:t> of </a:t>
             </a:r>
             <a:r>
-              <a:rPr lang="en-US" dirty="0" err="1" smtClean="0"/>
+              <a:rPr lang="en-US" dirty="0" err="1"/>
               <a:t>DNASequence</a:t>
             </a:r>
             <a:r>
-              <a:rPr lang="en-US" dirty="0" smtClean="0"/>
+              <a:rPr lang="en-US" dirty="0"/>
               <a:t> and </a:t>
             </a:r>
             <a:r>
-              <a:rPr lang="en-US" dirty="0" err="1" smtClean="0"/>
+              <a:rPr lang="en-US" dirty="0" err="1"/>
               <a:t>ProteinSequence</a:t>
             </a:r>
-            <a:endParaRPr lang="en-US" dirty="0" smtClean="0"/>
-          </a:p>
-          <a:p>
-            <a:r>
-              <a:rPr lang="en-US" dirty="0" smtClean="0"/>
+            <a:endParaRPr lang="en-US" dirty="0"/>
+          </a:p>
+          <a:p>
+            <a:r>
+              <a:rPr lang="en-US" dirty="0"/>
               <a:t>	</a:t>
             </a:r>
           </a:p>
           <a:p>
             <a:r>
-              <a:rPr lang="en-US" dirty="0" smtClean="0"/>
+              <a:rPr lang="en-US" dirty="0"/>
               <a:t>Still to come:</a:t>
             </a:r>
           </a:p>
           <a:p>
             <a:r>
-              <a:rPr lang="en-US" dirty="0" smtClean="0"/>
+              <a:rPr lang="en-US" dirty="0"/>
               <a:t>	Boxing and </a:t>
             </a:r>
             <a:r>
-              <a:rPr lang="en-US" dirty="0" err="1" smtClean="0"/>
+              <a:rPr lang="en-US" dirty="0" err="1"/>
               <a:t>unboxing</a:t>
             </a:r>
             <a:r>
-              <a:rPr lang="en-US" dirty="0" smtClean="0"/>
+              <a:rPr lang="en-US" dirty="0"/>
               <a:t> primitives in Java</a:t>
             </a:r>
           </a:p>
           <a:p>
             <a:r>
-              <a:rPr lang="en-US" dirty="0" smtClean="0"/>
+              <a:rPr lang="en-US" dirty="0"/>
               <a:t>	Exceptions</a:t>
             </a:r>
           </a:p>
           <a:p>
             <a:r>
-              <a:rPr lang="en-US" dirty="0" smtClean="0"/>
+              <a:rPr lang="en-US" dirty="0"/>
               <a:t>	Constructor chaining</a:t>
             </a:r>
           </a:p>
           <a:p>
             <a:r>
-              <a:rPr lang="en-US" dirty="0" smtClean="0"/>
+              <a:rPr lang="en-US" dirty="0"/>
               <a:t>	</a:t>
             </a:r>
             <a:r>
-              <a:rPr lang="en-US" dirty="0" err="1" smtClean="0"/>
+              <a:rPr lang="en-US" dirty="0" err="1"/>
               <a:t>HashMaps</a:t>
             </a:r>
             <a:r>
-              <a:rPr lang="en-US" dirty="0" smtClean="0"/>
+              <a:rPr lang="en-US" dirty="0"/>
               <a:t> and </a:t>
             </a:r>
             <a:r>
-              <a:rPr lang="en-US" dirty="0" err="1" smtClean="0"/>
+              <a:rPr lang="en-US" dirty="0" err="1"/>
               <a:t>HashSets</a:t>
             </a:r>
             <a:endParaRPr lang="en-US" dirty="0"/>
@@ -14224,18 +14140,13 @@
           <a:lstStyle/>
           <a:p>
             <a:r>
-              <a:rPr lang="en-US" dirty="0" smtClean="0">
+              <a:rPr lang="en-US" dirty="0">
                 <a:solidFill>
                   <a:srgbClr val="FF0000"/>
                 </a:solidFill>
               </a:rPr>
               <a:t>With abstract class….</a:t>
             </a:r>
-            <a:endParaRPr lang="en-US" dirty="0">
-              <a:solidFill>
-                <a:srgbClr val="FF0000"/>
-              </a:solidFill>
-            </a:endParaRPr>
           </a:p>
         </p:txBody>
       </p:sp>
@@ -14356,11 +14267,11 @@
           <a:lstStyle/>
           <a:p>
             <a:r>
-              <a:rPr lang="en-US" dirty="0" smtClean="0"/>
+              <a:rPr lang="en-US" dirty="0"/>
               <a:t>Circle </a:t>
             </a:r>
             <a:r>
-              <a:rPr lang="en-US" dirty="0" smtClean="0">
+              <a:rPr lang="en-US" dirty="0">
                 <a:solidFill>
                   <a:srgbClr val="FF0000"/>
                 </a:solidFill>
@@ -14368,10 +14279,9 @@
               <a:t>extends</a:t>
             </a:r>
             <a:r>
-              <a:rPr lang="en-US" dirty="0" smtClean="0"/>
+              <a:rPr lang="en-US" dirty="0"/>
               <a:t> shape</a:t>
             </a:r>
-            <a:endParaRPr lang="en-US" dirty="0"/>
           </a:p>
         </p:txBody>
       </p:sp>
@@ -14460,15 +14370,15 @@
           <a:lstStyle/>
           <a:p>
             <a:r>
-              <a:rPr lang="en-US" dirty="0" err="1" smtClean="0"/>
+              <a:rPr lang="en-US" dirty="0" err="1"/>
               <a:t>RegularPentagon</a:t>
             </a:r>
             <a:r>
-              <a:rPr lang="en-US" dirty="0" smtClean="0"/>
+              <a:rPr lang="en-US" dirty="0"/>
               <a:t> </a:t>
             </a:r>
             <a:r>
-              <a:rPr lang="en-US" dirty="0" smtClean="0">
+              <a:rPr lang="en-US" dirty="0">
                 <a:solidFill>
                   <a:srgbClr val="FF0000"/>
                 </a:solidFill>
@@ -14476,10 +14386,9 @@
               <a:t>extends</a:t>
             </a:r>
             <a:r>
-              <a:rPr lang="en-US" dirty="0" smtClean="0"/>
+              <a:rPr lang="en-US" dirty="0"/>
               <a:t> shape</a:t>
             </a:r>
-            <a:endParaRPr lang="en-US" dirty="0"/>
           </a:p>
         </p:txBody>
       </p:sp>
@@ -14517,7 +14426,7 @@
         <p:spPr>
           <a:xfrm>
             <a:off x="2819400" y="304800"/>
-            <a:ext cx="3429000" cy="990600"/>
+            <a:ext cx="3504998" cy="990600"/>
           </a:xfrm>
           <a:prstGeom prst="rect">
             <a:avLst/>
@@ -14602,10 +14511,9 @@
           <a:lstStyle/>
           <a:p>
             <a:r>
-              <a:rPr lang="en-US" dirty="0" smtClean="0"/>
+              <a:rPr lang="en-US" dirty="0"/>
               <a:t>Shape</a:t>
             </a:r>
-            <a:endParaRPr lang="en-US" dirty="0"/>
           </a:p>
         </p:txBody>
       </p:sp>
@@ -14632,18 +14540,17 @@
           <a:lstStyle/>
           <a:p>
             <a:r>
-              <a:rPr lang="en-US" dirty="0" smtClean="0"/>
+              <a:rPr lang="en-US" dirty="0"/>
               <a:t>abstract double </a:t>
             </a:r>
             <a:r>
-              <a:rPr lang="en-US" dirty="0" err="1" smtClean="0"/>
+              <a:rPr lang="en-US" dirty="0" err="1"/>
               <a:t>getArea</a:t>
             </a:r>
             <a:r>
-              <a:rPr lang="en-US" dirty="0" smtClean="0"/>
+              <a:rPr lang="en-US" dirty="0"/>
               <a:t>()</a:t>
             </a:r>
-            <a:endParaRPr lang="en-US" dirty="0"/>
           </a:p>
         </p:txBody>
       </p:sp>
@@ -14656,7 +14563,7 @@
         <p:spPr>
           <a:xfrm>
             <a:off x="2819400" y="914400"/>
-            <a:ext cx="3428246" cy="369332"/>
+            <a:ext cx="3504998" cy="369332"/>
           </a:xfrm>
           <a:prstGeom prst="rect">
             <a:avLst/>
@@ -14669,18 +14576,17 @@
           <a:lstStyle/>
           <a:p>
             <a:r>
-              <a:rPr lang="en-US" dirty="0" smtClean="0"/>
+              <a:rPr lang="en-US" dirty="0"/>
               <a:t>abstract double </a:t>
             </a:r>
             <a:r>
-              <a:rPr lang="en-US" dirty="0" err="1" smtClean="0"/>
-              <a:t>getCicumference</a:t>
-            </a:r>
-            <a:r>
-              <a:rPr lang="en-US" dirty="0" smtClean="0"/>
+              <a:rPr lang="en-US" dirty="0" err="1"/>
+              <a:t>getCircumference</a:t>
+            </a:r>
+            <a:r>
+              <a:rPr lang="en-US" dirty="0"/>
               <a:t>()</a:t>
             </a:r>
-            <a:endParaRPr lang="en-US" dirty="0"/>
           </a:p>
         </p:txBody>
       </p:sp>
@@ -14692,7 +14598,7 @@
         </p:nvSpPr>
         <p:spPr>
           <a:xfrm>
-            <a:off x="6024518" y="914400"/>
+            <a:off x="6100718" y="914400"/>
             <a:ext cx="300082" cy="369332"/>
           </a:xfrm>
           <a:prstGeom prst="rect">
@@ -14707,10 +14613,9 @@
           <a:lstStyle/>
           <a:p>
             <a:r>
-              <a:rPr lang="en-US" dirty="0" smtClean="0"/>
+              <a:rPr lang="en-US" dirty="0"/>
               <a:t>*</a:t>
             </a:r>
-            <a:endParaRPr lang="en-US" dirty="0"/>
           </a:p>
         </p:txBody>
       </p:sp>
@@ -14737,24 +14642,23 @@
           <a:lstStyle/>
           <a:p>
             <a:r>
-              <a:rPr lang="en-US" sz="1400" dirty="0" smtClean="0"/>
+              <a:rPr lang="en-US" sz="1400" dirty="0"/>
               <a:t>*- </a:t>
             </a:r>
             <a:r>
-              <a:rPr lang="en-US" sz="1400" dirty="0" err="1" smtClean="0"/>
+              <a:rPr lang="en-US" sz="1400" dirty="0" err="1"/>
               <a:t>getPerimeter</a:t>
             </a:r>
             <a:r>
-              <a:rPr lang="en-US" sz="1400" dirty="0" smtClean="0"/>
+              <a:rPr lang="en-US" sz="1400" dirty="0"/>
               <a:t>() might have been a better name for this, although according to </a:t>
             </a:r>
           </a:p>
           <a:p>
             <a:r>
-              <a:rPr lang="en-US" sz="1400" dirty="0" smtClean="0"/>
+              <a:rPr lang="en-US" sz="1400" dirty="0"/>
               <a:t>Dictionary.com circumference and perimeter can be synonyms</a:t>
             </a:r>
-            <a:endParaRPr lang="en-US" sz="1400" dirty="0"/>
           </a:p>
         </p:txBody>
       </p:sp>
@@ -14781,10 +14685,9 @@
           <a:lstStyle/>
           <a:p>
             <a:r>
-              <a:rPr lang="en-US" dirty="0" smtClean="0"/>
+              <a:rPr lang="en-US" dirty="0"/>
               <a:t>Circle</a:t>
             </a:r>
-            <a:endParaRPr lang="en-US" dirty="0"/>
           </a:p>
         </p:txBody>
       </p:sp>
@@ -14811,7 +14714,7 @@
           <a:lstStyle/>
           <a:p>
             <a:r>
-              <a:rPr lang="en-US" dirty="0" err="1" smtClean="0">
+              <a:rPr lang="en-US" dirty="0" err="1">
                 <a:solidFill>
                   <a:srgbClr val="FF0000"/>
                 </a:solidFill>
@@ -14917,7 +14820,7 @@
           <a:lstStyle/>
           <a:p>
             <a:r>
-              <a:rPr lang="en-US" dirty="0" err="1" smtClean="0">
+              <a:rPr lang="en-US" dirty="0" err="1">
                 <a:solidFill>
                   <a:srgbClr val="FF0000"/>
                 </a:solidFill>
@@ -14955,10 +14858,9 @@
           <a:lstStyle/>
           <a:p>
             <a:r>
-              <a:rPr lang="en-US" dirty="0" smtClean="0"/>
+              <a:rPr lang="en-US" dirty="0"/>
               <a:t>radius</a:t>
             </a:r>
-            <a:endParaRPr lang="en-US" dirty="0"/>
           </a:p>
         </p:txBody>
       </p:sp>
@@ -15018,10 +14920,9 @@
           <a:lstStyle/>
           <a:p>
             <a:r>
-              <a:rPr lang="en-US" smtClean="0"/>
+              <a:rPr lang="en-US"/>
               <a:t>overrides</a:t>
             </a:r>
-            <a:endParaRPr lang="en-US"/>
           </a:p>
         </p:txBody>
       </p:sp>
@@ -15047,14 +14948,13 @@
           <a:lstStyle/>
           <a:p>
             <a:r>
-              <a:rPr lang="en-US" dirty="0" err="1" smtClean="0"/>
+              <a:rPr lang="en-US" dirty="0" err="1"/>
               <a:t>getArea</a:t>
             </a:r>
             <a:r>
-              <a:rPr lang="en-US" dirty="0" smtClean="0"/>
+              <a:rPr lang="en-US" dirty="0"/>
               <a:t>()</a:t>
             </a:r>
-            <a:endParaRPr lang="en-US" dirty="0"/>
           </a:p>
         </p:txBody>
       </p:sp>
@@ -15067,7 +14967,7 @@
         <p:spPr>
           <a:xfrm>
             <a:off x="2661349" y="3276600"/>
-            <a:ext cx="1910651" cy="369332"/>
+            <a:ext cx="1987404" cy="369332"/>
           </a:xfrm>
           <a:prstGeom prst="rect">
             <a:avLst/>
@@ -15080,14 +14980,13 @@
           <a:lstStyle/>
           <a:p>
             <a:r>
-              <a:rPr lang="en-US" dirty="0" err="1" smtClean="0"/>
-              <a:t>getCicumference</a:t>
-            </a:r>
-            <a:r>
-              <a:rPr lang="en-US" dirty="0" smtClean="0"/>
+              <a:rPr lang="en-US" dirty="0" err="1"/>
+              <a:t>getCircumference</a:t>
+            </a:r>
+            <a:r>
+              <a:rPr lang="en-US" dirty="0"/>
               <a:t>()</a:t>
             </a:r>
-            <a:endParaRPr lang="en-US" dirty="0"/>
           </a:p>
         </p:txBody>
       </p:sp>
@@ -15114,11 +15013,11 @@
           <a:lstStyle/>
           <a:p>
             <a:r>
-              <a:rPr lang="en-US" dirty="0" smtClean="0"/>
+              <a:rPr lang="en-US" dirty="0"/>
               <a:t>Inheritance: Circle </a:t>
             </a:r>
             <a:r>
-              <a:rPr lang="en-US" dirty="0" smtClean="0">
+              <a:rPr lang="en-US" dirty="0">
                 <a:solidFill>
                   <a:srgbClr val="FF0000"/>
                 </a:solidFill>
@@ -15126,17 +15025,17 @@
               <a:t>is a</a:t>
             </a:r>
             <a:r>
-              <a:rPr lang="en-US" dirty="0" smtClean="0"/>
+              <a:rPr lang="en-US" dirty="0"/>
               <a:t> Shape.</a:t>
             </a:r>
           </a:p>
           <a:p>
             <a:r>
-              <a:rPr lang="en-US" dirty="0" smtClean="0"/>
+              <a:rPr lang="en-US" dirty="0"/>
               <a:t>Inheritance: Circle is a concrete </a:t>
             </a:r>
             <a:r>
-              <a:rPr lang="en-US" dirty="0" smtClean="0">
+              <a:rPr lang="en-US" dirty="0">
                 <a:solidFill>
                   <a:srgbClr val="FF0000"/>
                 </a:solidFill>
@@ -15144,17 +15043,17 @@
               <a:t>sub-class</a:t>
             </a:r>
             <a:r>
-              <a:rPr lang="en-US" dirty="0" smtClean="0"/>
+              <a:rPr lang="en-US" dirty="0"/>
               <a:t> of the Abstract class Shape.</a:t>
             </a:r>
           </a:p>
           <a:p>
             <a:r>
-              <a:rPr lang="en-US" dirty="0" smtClean="0"/>
+              <a:rPr lang="en-US" dirty="0"/>
               <a:t>Composition: Circle </a:t>
             </a:r>
             <a:r>
-              <a:rPr lang="en-US" dirty="0" smtClean="0">
+              <a:rPr lang="en-US" dirty="0">
                 <a:solidFill>
                   <a:srgbClr val="FF0000"/>
                 </a:solidFill>
@@ -15162,17 +15061,17 @@
               <a:t>has a</a:t>
             </a:r>
             <a:r>
-              <a:rPr lang="en-US" dirty="0" smtClean="0"/>
+              <a:rPr lang="en-US" dirty="0"/>
               <a:t> radius.</a:t>
             </a:r>
           </a:p>
           <a:p>
             <a:r>
-              <a:rPr lang="en-US" dirty="0" smtClean="0"/>
+              <a:rPr lang="en-US" dirty="0"/>
               <a:t>Circle </a:t>
             </a:r>
             <a:r>
-              <a:rPr lang="en-US" dirty="0" smtClean="0">
+              <a:rPr lang="en-US" dirty="0">
                 <a:solidFill>
                   <a:srgbClr val="FF0000"/>
                 </a:solidFill>
@@ -15180,33 +15079,33 @@
               <a:t>overrides</a:t>
             </a:r>
             <a:r>
-              <a:rPr lang="en-US" dirty="0" smtClean="0"/>
+              <a:rPr lang="en-US" dirty="0"/>
               <a:t> Shape’s abstract methods </a:t>
             </a:r>
             <a:r>
-              <a:rPr lang="en-US" dirty="0" err="1" smtClean="0"/>
+              <a:rPr lang="en-US" dirty="0" err="1"/>
               <a:t>getArea</a:t>
             </a:r>
             <a:r>
-              <a:rPr lang="en-US" dirty="0" smtClean="0"/>
+              <a:rPr lang="en-US" dirty="0"/>
               <a:t>() and </a:t>
             </a:r>
             <a:r>
-              <a:rPr lang="en-US" dirty="0" err="1" smtClean="0"/>
+              <a:rPr lang="en-US" dirty="0" err="1"/>
               <a:t>getCircumference</a:t>
             </a:r>
             <a:r>
-              <a:rPr lang="en-US" dirty="0" smtClean="0"/>
+              <a:rPr lang="en-US" dirty="0"/>
               <a:t>().</a:t>
             </a:r>
           </a:p>
           <a:p>
             <a:r>
-              <a:rPr lang="en-US" dirty="0" smtClean="0"/>
+              <a:rPr lang="en-US" dirty="0"/>
               <a:t>Circle can be </a:t>
             </a:r>
             <a:r>
-              <a:rPr lang="en-US" dirty="0" smtClean="0">
+              <a:rPr lang="en-US" dirty="0">
                 <a:solidFill>
                   <a:srgbClr val="FF0000"/>
                 </a:solidFill>
@@ -15214,7 +15113,7 @@
               <a:t>instantiated</a:t>
             </a:r>
             <a:r>
-              <a:rPr lang="en-US" dirty="0" smtClean="0"/>
+              <a:rPr lang="en-US" dirty="0"/>
               <a:t>.  Shape cannot be instantiated.</a:t>
             </a:r>
           </a:p>
@@ -15276,7 +15175,7 @@
           <a:lstStyle/>
           <a:p>
             <a:r>
-              <a:rPr lang="en-US" dirty="0" err="1" smtClean="0"/>
+              <a:rPr lang="en-US" dirty="0" err="1"/>
               <a:t>RegularPentagon</a:t>
             </a:r>
             <a:endParaRPr lang="en-US" dirty="0"/>
@@ -15339,7 +15238,7 @@
           <a:lstStyle/>
           <a:p>
             <a:r>
-              <a:rPr lang="en-US" dirty="0" err="1" smtClean="0">
+              <a:rPr lang="en-US" dirty="0" err="1">
                 <a:solidFill>
                   <a:srgbClr val="FF0000"/>
                 </a:solidFill>
@@ -15377,7 +15276,7 @@
           <a:lstStyle/>
           <a:p>
             <a:r>
-              <a:rPr lang="en-US" dirty="0" err="1" smtClean="0"/>
+              <a:rPr lang="en-US" dirty="0" err="1"/>
               <a:t>sideLength</a:t>
             </a:r>
             <a:endParaRPr lang="en-US" dirty="0"/>
@@ -15440,10 +15339,9 @@
           <a:lstStyle/>
           <a:p>
             <a:r>
-              <a:rPr lang="en-US" smtClean="0"/>
+              <a:rPr lang="en-US"/>
               <a:t>overrides</a:t>
             </a:r>
-            <a:endParaRPr lang="en-US"/>
           </a:p>
         </p:txBody>
       </p:sp>
@@ -15469,14 +15367,13 @@
           <a:lstStyle/>
           <a:p>
             <a:r>
-              <a:rPr lang="en-US" dirty="0" err="1" smtClean="0"/>
+              <a:rPr lang="en-US" dirty="0" err="1"/>
               <a:t>getArea</a:t>
             </a:r>
             <a:r>
-              <a:rPr lang="en-US" dirty="0" smtClean="0"/>
+              <a:rPr lang="en-US" dirty="0"/>
               <a:t>()</a:t>
             </a:r>
-            <a:endParaRPr lang="en-US" dirty="0"/>
           </a:p>
         </p:txBody>
       </p:sp>
@@ -15489,7 +15386,7 @@
         <p:spPr>
           <a:xfrm>
             <a:off x="6090349" y="3264932"/>
-            <a:ext cx="1910651" cy="369332"/>
+            <a:ext cx="1987404" cy="369332"/>
           </a:xfrm>
           <a:prstGeom prst="rect">
             <a:avLst/>
@@ -15502,14 +15399,13 @@
           <a:lstStyle/>
           <a:p>
             <a:r>
-              <a:rPr lang="en-US" dirty="0" err="1" smtClean="0"/>
-              <a:t>getCicumference</a:t>
-            </a:r>
-            <a:r>
-              <a:rPr lang="en-US" dirty="0" smtClean="0"/>
+              <a:rPr lang="en-US" dirty="0" err="1"/>
+              <a:t>getCircumference</a:t>
+            </a:r>
+            <a:r>
+              <a:rPr lang="en-US" dirty="0"/>
               <a:t>()</a:t>
             </a:r>
-            <a:endParaRPr lang="en-US" dirty="0"/>
           </a:p>
         </p:txBody>
       </p:sp>
@@ -15536,7 +15432,7 @@
           <a:lstStyle/>
           <a:p>
             <a:r>
-              <a:rPr lang="en-US" dirty="0" err="1" smtClean="0">
+              <a:rPr lang="en-US" dirty="0" err="1">
                 <a:solidFill>
                   <a:srgbClr val="FF0000"/>
                 </a:solidFill>
@@ -15670,10 +15566,9 @@
           <a:lstStyle/>
           <a:p>
             <a:r>
-              <a:rPr lang="en-US" dirty="0" smtClean="0"/>
+              <a:rPr lang="en-US" dirty="0"/>
               <a:t>Shape</a:t>
             </a:r>
-            <a:endParaRPr lang="en-US" dirty="0"/>
           </a:p>
         </p:txBody>
       </p:sp>
@@ -15700,18 +15595,17 @@
           <a:lstStyle/>
           <a:p>
             <a:r>
-              <a:rPr lang="en-US" dirty="0" smtClean="0"/>
+              <a:rPr lang="en-US" dirty="0"/>
               <a:t>abstract double </a:t>
             </a:r>
             <a:r>
-              <a:rPr lang="en-US" dirty="0" err="1" smtClean="0"/>
+              <a:rPr lang="en-US" dirty="0" err="1"/>
               <a:t>getArea</a:t>
             </a:r>
             <a:r>
-              <a:rPr lang="en-US" dirty="0" smtClean="0"/>
+              <a:rPr lang="en-US" dirty="0"/>
               <a:t>()</a:t>
             </a:r>
-            <a:endParaRPr lang="en-US" dirty="0"/>
           </a:p>
         </p:txBody>
       </p:sp>
@@ -15724,7 +15618,7 @@
         <p:spPr>
           <a:xfrm>
             <a:off x="2819400" y="914400"/>
-            <a:ext cx="3428246" cy="369332"/>
+            <a:ext cx="3504998" cy="369332"/>
           </a:xfrm>
           <a:prstGeom prst="rect">
             <a:avLst/>
@@ -15737,31 +15631,30 @@
           <a:lstStyle/>
           <a:p>
             <a:r>
-              <a:rPr lang="en-US" dirty="0" smtClean="0"/>
+              <a:rPr lang="en-US" dirty="0"/>
               <a:t>abstract double </a:t>
             </a:r>
             <a:r>
-              <a:rPr lang="en-US" dirty="0" err="1" smtClean="0"/>
-              <a:t>getCicumference</a:t>
-            </a:r>
-            <a:r>
-              <a:rPr lang="en-US" dirty="0" smtClean="0"/>
+              <a:rPr lang="en-US" dirty="0" err="1"/>
+              <a:t>getCircumference</a:t>
+            </a:r>
+            <a:r>
+              <a:rPr lang="en-US" dirty="0"/>
               <a:t>()</a:t>
             </a:r>
-            <a:endParaRPr lang="en-US" dirty="0"/>
-          </a:p>
-        </p:txBody>
-      </p:sp>
-      <p:sp>
-        <p:nvSpPr>
-          <p:cNvPr id="9" name="TextBox 8"/>
+          </a:p>
+        </p:txBody>
+      </p:sp>
+      <p:sp>
+        <p:nvSpPr>
+          <p:cNvPr id="11" name="TextBox 10"/>
           <p:cNvSpPr txBox="1"/>
           <p:nvPr/>
         </p:nvSpPr>
         <p:spPr>
           <a:xfrm>
-            <a:off x="6024518" y="914400"/>
-            <a:ext cx="300082" cy="369332"/>
+            <a:off x="2267953" y="2221468"/>
+            <a:ext cx="703847" cy="369332"/>
           </a:xfrm>
           <a:prstGeom prst="rect">
             <a:avLst/>
@@ -15775,23 +15668,22 @@
           <a:lstStyle/>
           <a:p>
             <a:r>
-              <a:rPr lang="en-US" dirty="0" smtClean="0"/>
-              <a:t>*</a:t>
-            </a:r>
-            <a:endParaRPr lang="en-US" dirty="0"/>
-          </a:p>
-        </p:txBody>
-      </p:sp>
-      <p:sp>
-        <p:nvSpPr>
-          <p:cNvPr id="11" name="TextBox 10"/>
+              <a:rPr lang="en-US" dirty="0"/>
+              <a:t>Circle</a:t>
+            </a:r>
+          </a:p>
+        </p:txBody>
+      </p:sp>
+      <p:sp>
+        <p:nvSpPr>
+          <p:cNvPr id="12" name="TextBox 11"/>
           <p:cNvSpPr txBox="1"/>
           <p:nvPr/>
         </p:nvSpPr>
         <p:spPr>
           <a:xfrm>
-            <a:off x="2267953" y="2221468"/>
-            <a:ext cx="703847" cy="369332"/>
+            <a:off x="3048000" y="1676400"/>
+            <a:ext cx="460382" cy="369332"/>
           </a:xfrm>
           <a:prstGeom prst="rect">
             <a:avLst/>
@@ -15805,37 +15697,7 @@
           <a:lstStyle/>
           <a:p>
             <a:r>
-              <a:rPr lang="en-US" dirty="0" smtClean="0"/>
-              <a:t>Circle</a:t>
-            </a:r>
-            <a:endParaRPr lang="en-US" dirty="0"/>
-          </a:p>
-        </p:txBody>
-      </p:sp>
-      <p:sp>
-        <p:nvSpPr>
-          <p:cNvPr id="12" name="TextBox 11"/>
-          <p:cNvSpPr txBox="1"/>
-          <p:nvPr/>
-        </p:nvSpPr>
-        <p:spPr>
-          <a:xfrm>
-            <a:off x="3048000" y="1676400"/>
-            <a:ext cx="460382" cy="369332"/>
-          </a:xfrm>
-          <a:prstGeom prst="rect">
-            <a:avLst/>
-          </a:prstGeom>
-          <a:noFill/>
-        </p:spPr>
-        <p:txBody>
-          <a:bodyPr wrap="none" rtlCol="0">
-            <a:spAutoFit/>
-          </a:bodyPr>
-          <a:lstStyle/>
-          <a:p>
-            <a:r>
-              <a:rPr lang="en-US" dirty="0" err="1" smtClean="0">
+              <a:rPr lang="en-US" dirty="0" err="1">
                 <a:solidFill>
                   <a:srgbClr val="FF0000"/>
                 </a:solidFill>
@@ -15941,7 +15803,7 @@
           <a:lstStyle/>
           <a:p>
             <a:r>
-              <a:rPr lang="en-US" dirty="0" err="1" smtClean="0">
+              <a:rPr lang="en-US" dirty="0" err="1">
                 <a:solidFill>
                   <a:srgbClr val="FF0000"/>
                 </a:solidFill>
@@ -15979,10 +15841,9 @@
           <a:lstStyle/>
           <a:p>
             <a:r>
-              <a:rPr lang="en-US" dirty="0" smtClean="0"/>
+              <a:rPr lang="en-US" dirty="0"/>
               <a:t>radius</a:t>
             </a:r>
-            <a:endParaRPr lang="en-US" dirty="0"/>
           </a:p>
         </p:txBody>
       </p:sp>
@@ -16042,10 +15903,9 @@
           <a:lstStyle/>
           <a:p>
             <a:r>
-              <a:rPr lang="en-US" smtClean="0"/>
+              <a:rPr lang="en-US"/>
               <a:t>overrides</a:t>
             </a:r>
-            <a:endParaRPr lang="en-US"/>
           </a:p>
         </p:txBody>
       </p:sp>
@@ -16071,14 +15931,13 @@
           <a:lstStyle/>
           <a:p>
             <a:r>
-              <a:rPr lang="en-US" dirty="0" err="1" smtClean="0"/>
+              <a:rPr lang="en-US" dirty="0" err="1"/>
               <a:t>getArea</a:t>
             </a:r>
             <a:r>
-              <a:rPr lang="en-US" dirty="0" smtClean="0"/>
+              <a:rPr lang="en-US" dirty="0"/>
               <a:t>()</a:t>
             </a:r>
-            <a:endParaRPr lang="en-US" dirty="0"/>
           </a:p>
         </p:txBody>
       </p:sp>
@@ -16091,7 +15950,7 @@
         <p:spPr>
           <a:xfrm>
             <a:off x="2661349" y="3276600"/>
-            <a:ext cx="1910651" cy="369332"/>
+            <a:ext cx="1987404" cy="369332"/>
           </a:xfrm>
           <a:prstGeom prst="rect">
             <a:avLst/>
@@ -16104,14 +15963,13 @@
           <a:lstStyle/>
           <a:p>
             <a:r>
-              <a:rPr lang="en-US" dirty="0" err="1" smtClean="0"/>
-              <a:t>getCicumference</a:t>
-            </a:r>
-            <a:r>
-              <a:rPr lang="en-US" dirty="0" smtClean="0"/>
+              <a:rPr lang="en-US" dirty="0" err="1"/>
+              <a:t>getCircumference</a:t>
+            </a:r>
+            <a:r>
+              <a:rPr lang="en-US" dirty="0"/>
               <a:t>()</a:t>
             </a:r>
-            <a:endParaRPr lang="en-US" dirty="0"/>
           </a:p>
         </p:txBody>
       </p:sp>
@@ -16138,19 +15996,19 @@
           <a:lstStyle/>
           <a:p>
             <a:r>
-              <a:rPr lang="en-US" dirty="0" smtClean="0"/>
+              <a:rPr lang="en-US" dirty="0"/>
               <a:t>Inheritance: </a:t>
             </a:r>
             <a:r>
-              <a:rPr lang="en-US" dirty="0" err="1" smtClean="0"/>
+              <a:rPr lang="en-US" dirty="0" err="1"/>
               <a:t>RegularPentagon</a:t>
             </a:r>
             <a:r>
-              <a:rPr lang="en-US" dirty="0" smtClean="0"/>
+              <a:rPr lang="en-US" dirty="0"/>
               <a:t> </a:t>
             </a:r>
             <a:r>
-              <a:rPr lang="en-US" dirty="0" smtClean="0">
+              <a:rPr lang="en-US" dirty="0">
                 <a:solidFill>
                   <a:srgbClr val="FF0000"/>
                 </a:solidFill>
@@ -16158,25 +16016,25 @@
               <a:t>is a</a:t>
             </a:r>
             <a:r>
-              <a:rPr lang="en-US" dirty="0" smtClean="0"/>
+              <a:rPr lang="en-US" dirty="0"/>
               <a:t> Shape.</a:t>
             </a:r>
           </a:p>
           <a:p>
             <a:r>
-              <a:rPr lang="en-US" dirty="0" smtClean="0"/>
+              <a:rPr lang="en-US" dirty="0"/>
               <a:t>Inheritance: </a:t>
             </a:r>
             <a:r>
-              <a:rPr lang="en-US" dirty="0" err="1" smtClean="0"/>
+              <a:rPr lang="en-US" dirty="0" err="1"/>
               <a:t>RegularPentagon</a:t>
             </a:r>
             <a:r>
-              <a:rPr lang="en-US" dirty="0" smtClean="0"/>
+              <a:rPr lang="en-US" dirty="0"/>
               <a:t> is a concrete </a:t>
             </a:r>
             <a:r>
-              <a:rPr lang="en-US" dirty="0" smtClean="0">
+              <a:rPr lang="en-US" dirty="0">
                 <a:solidFill>
                   <a:srgbClr val="FF0000"/>
                 </a:solidFill>
@@ -16184,25 +16042,25 @@
               <a:t>sub-class</a:t>
             </a:r>
             <a:r>
-              <a:rPr lang="en-US" dirty="0" smtClean="0"/>
+              <a:rPr lang="en-US" dirty="0"/>
               <a:t> of the Abstract class Shape.</a:t>
             </a:r>
           </a:p>
           <a:p>
             <a:r>
-              <a:rPr lang="en-US" dirty="0" smtClean="0"/>
+              <a:rPr lang="en-US" dirty="0"/>
               <a:t>Composition: </a:t>
             </a:r>
             <a:r>
-              <a:rPr lang="en-US" dirty="0" err="1" smtClean="0"/>
+              <a:rPr lang="en-US" dirty="0" err="1"/>
               <a:t>RegularPentagon</a:t>
             </a:r>
             <a:r>
-              <a:rPr lang="en-US" dirty="0" smtClean="0"/>
+              <a:rPr lang="en-US" dirty="0"/>
               <a:t> </a:t>
             </a:r>
             <a:r>
-              <a:rPr lang="en-US" dirty="0" smtClean="0">
+              <a:rPr lang="en-US" dirty="0">
                 <a:solidFill>
                   <a:srgbClr val="FF0000"/>
                 </a:solidFill>
@@ -16210,29 +16068,29 @@
               <a:t>has a</a:t>
             </a:r>
             <a:r>
-              <a:rPr lang="en-US" dirty="0" smtClean="0"/>
+              <a:rPr lang="en-US" dirty="0"/>
               <a:t> </a:t>
             </a:r>
             <a:r>
-              <a:rPr lang="en-US" dirty="0" err="1" smtClean="0"/>
+              <a:rPr lang="en-US" dirty="0" err="1"/>
               <a:t>sideLength</a:t>
             </a:r>
             <a:r>
-              <a:rPr lang="en-US" dirty="0" smtClean="0"/>
+              <a:rPr lang="en-US" dirty="0"/>
               <a:t>.</a:t>
             </a:r>
           </a:p>
           <a:p>
             <a:r>
-              <a:rPr lang="en-US" dirty="0" err="1" smtClean="0"/>
+              <a:rPr lang="en-US" dirty="0" err="1"/>
               <a:t>RegularPentagon</a:t>
             </a:r>
             <a:r>
-              <a:rPr lang="en-US" dirty="0" smtClean="0"/>
+              <a:rPr lang="en-US" dirty="0"/>
               <a:t> </a:t>
             </a:r>
             <a:r>
-              <a:rPr lang="en-US" dirty="0" smtClean="0">
+              <a:rPr lang="en-US" dirty="0">
                 <a:solidFill>
                   <a:srgbClr val="FF0000"/>
                 </a:solidFill>
@@ -16240,37 +16098,37 @@
               <a:t>overrides</a:t>
             </a:r>
             <a:r>
-              <a:rPr lang="en-US" dirty="0" smtClean="0"/>
+              <a:rPr lang="en-US" dirty="0"/>
               <a:t> Shape’s abstract methods </a:t>
             </a:r>
             <a:r>
-              <a:rPr lang="en-US" dirty="0" err="1" smtClean="0"/>
+              <a:rPr lang="en-US" dirty="0" err="1"/>
               <a:t>getArea</a:t>
             </a:r>
             <a:r>
-              <a:rPr lang="en-US" dirty="0" smtClean="0"/>
+              <a:rPr lang="en-US" dirty="0"/>
               <a:t>() and </a:t>
             </a:r>
             <a:r>
-              <a:rPr lang="en-US" dirty="0" err="1" smtClean="0"/>
+              <a:rPr lang="en-US" dirty="0" err="1"/>
               <a:t>getCircumference</a:t>
             </a:r>
             <a:r>
-              <a:rPr lang="en-US" dirty="0" smtClean="0"/>
+              <a:rPr lang="en-US" dirty="0"/>
               <a:t>().</a:t>
             </a:r>
           </a:p>
           <a:p>
             <a:r>
-              <a:rPr lang="en-US" dirty="0" err="1" smtClean="0"/>
+              <a:rPr lang="en-US" dirty="0" err="1"/>
               <a:t>RegularPentagon</a:t>
             </a:r>
             <a:r>
-              <a:rPr lang="en-US" dirty="0" smtClean="0"/>
+              <a:rPr lang="en-US" dirty="0"/>
               <a:t> can be </a:t>
             </a:r>
             <a:r>
-              <a:rPr lang="en-US" dirty="0" smtClean="0">
+              <a:rPr lang="en-US" dirty="0">
                 <a:solidFill>
                   <a:srgbClr val="FF0000"/>
                 </a:solidFill>
@@ -16278,7 +16136,7 @@
               <a:t>instantiated</a:t>
             </a:r>
             <a:r>
-              <a:rPr lang="en-US" dirty="0" smtClean="0"/>
+              <a:rPr lang="en-US" dirty="0"/>
               <a:t>.  Shape cannot be instantiated.</a:t>
             </a:r>
           </a:p>
@@ -16340,7 +16198,7 @@
           <a:lstStyle/>
           <a:p>
             <a:r>
-              <a:rPr lang="en-US" dirty="0" err="1" smtClean="0"/>
+              <a:rPr lang="en-US" dirty="0" err="1"/>
               <a:t>RegularPentagon</a:t>
             </a:r>
             <a:endParaRPr lang="en-US" dirty="0"/>
@@ -16403,7 +16261,7 @@
           <a:lstStyle/>
           <a:p>
             <a:r>
-              <a:rPr lang="en-US" dirty="0" err="1" smtClean="0">
+              <a:rPr lang="en-US" dirty="0" err="1">
                 <a:solidFill>
                   <a:srgbClr val="FF0000"/>
                 </a:solidFill>
@@ -16441,7 +16299,7 @@
           <a:lstStyle/>
           <a:p>
             <a:r>
-              <a:rPr lang="en-US" dirty="0" err="1" smtClean="0"/>
+              <a:rPr lang="en-US" dirty="0" err="1"/>
               <a:t>sideLength</a:t>
             </a:r>
             <a:endParaRPr lang="en-US" dirty="0"/>
@@ -16504,10 +16362,9 @@
           <a:lstStyle/>
           <a:p>
             <a:r>
-              <a:rPr lang="en-US" smtClean="0"/>
+              <a:rPr lang="en-US"/>
               <a:t>overrides</a:t>
             </a:r>
-            <a:endParaRPr lang="en-US"/>
           </a:p>
         </p:txBody>
       </p:sp>
@@ -16533,14 +16390,13 @@
           <a:lstStyle/>
           <a:p>
             <a:r>
-              <a:rPr lang="en-US" dirty="0" err="1" smtClean="0"/>
+              <a:rPr lang="en-US" dirty="0" err="1"/>
               <a:t>getArea</a:t>
             </a:r>
             <a:r>
-              <a:rPr lang="en-US" dirty="0" smtClean="0"/>
+              <a:rPr lang="en-US" dirty="0"/>
               <a:t>()</a:t>
             </a:r>
-            <a:endParaRPr lang="en-US" dirty="0"/>
           </a:p>
         </p:txBody>
       </p:sp>
@@ -16553,7 +16409,7 @@
         <p:spPr>
           <a:xfrm>
             <a:off x="6090349" y="3264932"/>
-            <a:ext cx="1910651" cy="369332"/>
+            <a:ext cx="1987404" cy="369332"/>
           </a:xfrm>
           <a:prstGeom prst="rect">
             <a:avLst/>
@@ -16566,14 +16422,13 @@
           <a:lstStyle/>
           <a:p>
             <a:r>
-              <a:rPr lang="en-US" dirty="0" err="1" smtClean="0"/>
-              <a:t>getCicumference</a:t>
-            </a:r>
-            <a:r>
-              <a:rPr lang="en-US" dirty="0" smtClean="0"/>
+              <a:rPr lang="en-US" dirty="0" err="1"/>
+              <a:t>getCircumference</a:t>
+            </a:r>
+            <a:r>
+              <a:rPr lang="en-US" dirty="0"/>
               <a:t>()</a:t>
             </a:r>
-            <a:endParaRPr lang="en-US" dirty="0"/>
           </a:p>
         </p:txBody>
       </p:sp>
@@ -16600,7 +16455,7 @@
           <a:lstStyle/>
           <a:p>
             <a:r>
-              <a:rPr lang="en-US" dirty="0" err="1" smtClean="0">
+              <a:rPr lang="en-US" dirty="0" err="1">
                 <a:solidFill>
                   <a:srgbClr val="FF0000"/>
                 </a:solidFill>
@@ -16663,10 +16518,9 @@
           <a:lstStyle/>
           <a:p>
             <a:r>
-              <a:rPr lang="en-US" dirty="0" smtClean="0"/>
+              <a:rPr lang="en-US" dirty="0"/>
               <a:t>Our test code does not change at all whether Shape is an interface or an Abstract Class</a:t>
             </a:r>
-            <a:endParaRPr lang="en-US" dirty="0"/>
           </a:p>
         </p:txBody>
       </p:sp>
@@ -16782,25 +16636,24 @@
           <a:lstStyle/>
           <a:p>
             <a:r>
-              <a:rPr lang="en-US" dirty="0" smtClean="0"/>
+              <a:rPr lang="en-US" dirty="0"/>
               <a:t>A class can implement multiple interfaces.</a:t>
             </a:r>
           </a:p>
           <a:p>
-            <a:endParaRPr lang="en-US" dirty="0" smtClean="0"/>
-          </a:p>
-          <a:p>
-            <a:r>
-              <a:rPr lang="en-US" dirty="0" smtClean="0"/>
+            <a:endParaRPr lang="en-US" dirty="0"/>
+          </a:p>
+          <a:p>
+            <a:r>
+              <a:rPr lang="en-US" dirty="0"/>
               <a:t>A class can only extend on class </a:t>
             </a:r>
           </a:p>
           <a:p>
             <a:r>
-              <a:rPr lang="en-US" dirty="0" smtClean="0"/>
+              <a:rPr lang="en-US" dirty="0"/>
               <a:t>(i.e. no multiple inheritance in Java )</a:t>
             </a:r>
-            <a:endParaRPr lang="en-US" dirty="0"/>
           </a:p>
         </p:txBody>
       </p:sp>
@@ -16852,11 +16705,11 @@
           <a:lstStyle/>
           <a:p>
             <a:r>
-              <a:rPr lang="en-US" dirty="0" smtClean="0"/>
+              <a:rPr lang="en-US" dirty="0"/>
               <a:t>In an </a:t>
             </a:r>
             <a:r>
-              <a:rPr lang="en-US" dirty="0" smtClean="0">
+              <a:rPr lang="en-US" dirty="0">
                 <a:solidFill>
                   <a:srgbClr val="FF0000"/>
                 </a:solidFill>
@@ -16864,35 +16717,35 @@
               <a:t>interface</a:t>
             </a:r>
             <a:r>
-              <a:rPr lang="en-US" dirty="0" smtClean="0"/>
+              <a:rPr lang="en-US" dirty="0"/>
               <a:t>, you can only list the function names.</a:t>
             </a:r>
           </a:p>
           <a:p>
-            <a:endParaRPr lang="en-US" dirty="0" smtClean="0"/>
-          </a:p>
-          <a:p>
-            <a:r>
-              <a:rPr lang="en-US" dirty="0" smtClean="0"/>
+            <a:endParaRPr lang="en-US" dirty="0"/>
+          </a:p>
+          <a:p>
+            <a:r>
+              <a:rPr lang="en-US" dirty="0"/>
               <a:t>In an abstract class, you can add non-abstract functions and they will be </a:t>
             </a:r>
           </a:p>
           <a:p>
             <a:r>
-              <a:rPr lang="en-US" dirty="0" smtClean="0"/>
+              <a:rPr lang="en-US" dirty="0"/>
               <a:t>inherited by the sub-classes.</a:t>
             </a:r>
           </a:p>
           <a:p>
-            <a:endParaRPr lang="en-US" dirty="0" smtClean="0"/>
-          </a:p>
-          <a:p>
-            <a:r>
-              <a:rPr lang="en-US" dirty="0" smtClean="0"/>
+            <a:endParaRPr lang="en-US" dirty="0"/>
+          </a:p>
+          <a:p>
+            <a:r>
+              <a:rPr lang="en-US" dirty="0"/>
               <a:t>Let’s say we want to impose a </a:t>
             </a:r>
             <a:r>
-              <a:rPr lang="en-US" dirty="0" smtClean="0">
+              <a:rPr lang="en-US" dirty="0">
                 <a:solidFill>
                   <a:srgbClr val="FF0000"/>
                 </a:solidFill>
@@ -16900,18 +16753,18 @@
               <a:t>natural order</a:t>
             </a:r>
             <a:r>
-              <a:rPr lang="en-US" dirty="0" smtClean="0"/>
+              <a:rPr lang="en-US" dirty="0"/>
               <a:t> on our Shape class so that</a:t>
             </a:r>
           </a:p>
           <a:p>
             <a:r>
-              <a:rPr lang="en-US" dirty="0" smtClean="0"/>
+              <a:rPr lang="en-US" dirty="0"/>
               <a:t>we can sort our Shapes by area without making a new Comparator.</a:t>
             </a:r>
           </a:p>
           <a:p>
-            <a:endParaRPr lang="en-US" dirty="0" smtClean="0"/>
+            <a:endParaRPr lang="en-US" dirty="0"/>
           </a:p>
         </p:txBody>
       </p:sp>
@@ -16938,10 +16791,9 @@
           <a:lstStyle/>
           <a:p>
             <a:r>
-              <a:rPr lang="en-US" dirty="0" smtClean="0"/>
+              <a:rPr lang="en-US" dirty="0"/>
               <a:t>So why bother with inheritance when we already have interfaces?</a:t>
             </a:r>
-            <a:endParaRPr lang="en-US" dirty="0"/>
           </a:p>
         </p:txBody>
       </p:sp>

</xml_diff>